<commit_message>
Commit to complete rough draft
</commit_message>
<xml_diff>
--- a/Breweries and Beer Study.pptx
+++ b/Breweries and Beer Study.pptx
@@ -5,7 +5,7 @@
     <p:sldMasterId id="2147483696" r:id="rId1"/>
   </p:sldMasterIdLst>
   <p:notesMasterIdLst>
-    <p:notesMasterId r:id="rId19"/>
+    <p:notesMasterId r:id="rId20"/>
   </p:notesMasterIdLst>
   <p:sldIdLst>
     <p:sldId id="256" r:id="rId2"/>
@@ -22,9 +22,10 @@
     <p:sldId id="267" r:id="rId13"/>
     <p:sldId id="268" r:id="rId14"/>
     <p:sldId id="269" r:id="rId15"/>
-    <p:sldId id="270" r:id="rId16"/>
-    <p:sldId id="271" r:id="rId17"/>
-    <p:sldId id="272" r:id="rId18"/>
+    <p:sldId id="273" r:id="rId16"/>
+    <p:sldId id="270" r:id="rId17"/>
+    <p:sldId id="271" r:id="rId18"/>
+    <p:sldId id="272" r:id="rId19"/>
   </p:sldIdLst>
   <p:sldSz cx="12192000" cy="6858000"/>
   <p:notesSz cx="6858000" cy="9144000"/>
@@ -213,7 +214,7 @@
           <a:p>
             <a:fld id="{0257D765-DFDE-4CE3-ABA3-B121D8D16204}" type="datetimeFigureOut">
               <a:rPr lang="en-US" smtClean="0"/>
-              <a:t>2/23/2019</a:t>
+              <a:t>2/24/2019</a:t>
             </a:fld>
             <a:endParaRPr lang="en-US"/>
           </a:p>
@@ -608,7 +609,7 @@
           <a:bodyPr/>
           <a:lstStyle/>
           <a:p>
-            <a:endParaRPr lang="en-US"/>
+            <a:endParaRPr lang="en-US" dirty="0"/>
           </a:p>
         </p:txBody>
       </p:sp>
@@ -1370,7 +1371,7 @@
           <a:p>
             <a:fld id="{99EF30BF-B2AF-40A2-882C-4069CB9E54A2}" type="datetimeFigureOut">
               <a:rPr lang="en-US" smtClean="0"/>
-              <a:t>2/23/2019</a:t>
+              <a:t>2/24/2019</a:t>
             </a:fld>
             <a:endParaRPr lang="en-US"/>
           </a:p>
@@ -1621,7 +1622,7 @@
           <a:p>
             <a:fld id="{99EF30BF-B2AF-40A2-882C-4069CB9E54A2}" type="datetimeFigureOut">
               <a:rPr lang="en-US" smtClean="0"/>
-              <a:t>2/23/2019</a:t>
+              <a:t>2/24/2019</a:t>
             </a:fld>
             <a:endParaRPr lang="en-US"/>
           </a:p>
@@ -1935,7 +1936,7 @@
           <a:p>
             <a:fld id="{99EF30BF-B2AF-40A2-882C-4069CB9E54A2}" type="datetimeFigureOut">
               <a:rPr lang="en-US" smtClean="0"/>
-              <a:t>2/23/2019</a:t>
+              <a:t>2/24/2019</a:t>
             </a:fld>
             <a:endParaRPr lang="en-US"/>
           </a:p>
@@ -2276,7 +2277,7 @@
           <a:p>
             <a:fld id="{99EF30BF-B2AF-40A2-882C-4069CB9E54A2}" type="datetimeFigureOut">
               <a:rPr lang="en-US" smtClean="0"/>
-              <a:t>2/23/2019</a:t>
+              <a:t>2/24/2019</a:t>
             </a:fld>
             <a:endParaRPr lang="en-US"/>
           </a:p>
@@ -2590,7 +2591,7 @@
           <a:p>
             <a:fld id="{99EF30BF-B2AF-40A2-882C-4069CB9E54A2}" type="datetimeFigureOut">
               <a:rPr lang="en-US" smtClean="0"/>
-              <a:t>2/23/2019</a:t>
+              <a:t>2/24/2019</a:t>
             </a:fld>
             <a:endParaRPr lang="en-US"/>
           </a:p>
@@ -2983,7 +2984,7 @@
           <a:p>
             <a:fld id="{99EF30BF-B2AF-40A2-882C-4069CB9E54A2}" type="datetimeFigureOut">
               <a:rPr lang="en-US" smtClean="0"/>
-              <a:t>2/23/2019</a:t>
+              <a:t>2/24/2019</a:t>
             </a:fld>
             <a:endParaRPr lang="en-US"/>
           </a:p>
@@ -3153,7 +3154,7 @@
           <a:p>
             <a:fld id="{99EF30BF-B2AF-40A2-882C-4069CB9E54A2}" type="datetimeFigureOut">
               <a:rPr lang="en-US" smtClean="0"/>
-              <a:t>2/23/2019</a:t>
+              <a:t>2/24/2019</a:t>
             </a:fld>
             <a:endParaRPr lang="en-US"/>
           </a:p>
@@ -3333,7 +3334,7 @@
           <a:p>
             <a:fld id="{99EF30BF-B2AF-40A2-882C-4069CB9E54A2}" type="datetimeFigureOut">
               <a:rPr lang="en-US" smtClean="0"/>
-              <a:t>2/23/2019</a:t>
+              <a:t>2/24/2019</a:t>
             </a:fld>
             <a:endParaRPr lang="en-US"/>
           </a:p>
@@ -3509,7 +3510,7 @@
           <a:p>
             <a:fld id="{99EF30BF-B2AF-40A2-882C-4069CB9E54A2}" type="datetimeFigureOut">
               <a:rPr lang="en-US" smtClean="0"/>
-              <a:t>2/23/2019</a:t>
+              <a:t>2/24/2019</a:t>
             </a:fld>
             <a:endParaRPr lang="en-US"/>
           </a:p>
@@ -3756,7 +3757,7 @@
           <a:p>
             <a:fld id="{99EF30BF-B2AF-40A2-882C-4069CB9E54A2}" type="datetimeFigureOut">
               <a:rPr lang="en-US" smtClean="0"/>
-              <a:t>2/23/2019</a:t>
+              <a:t>2/24/2019</a:t>
             </a:fld>
             <a:endParaRPr lang="en-US"/>
           </a:p>
@@ -3988,7 +3989,7 @@
           <a:p>
             <a:fld id="{99EF30BF-B2AF-40A2-882C-4069CB9E54A2}" type="datetimeFigureOut">
               <a:rPr lang="en-US" smtClean="0"/>
-              <a:t>2/23/2019</a:t>
+              <a:t>2/24/2019</a:t>
             </a:fld>
             <a:endParaRPr lang="en-US"/>
           </a:p>
@@ -4362,7 +4363,7 @@
           <a:p>
             <a:fld id="{99EF30BF-B2AF-40A2-882C-4069CB9E54A2}" type="datetimeFigureOut">
               <a:rPr lang="en-US" smtClean="0"/>
-              <a:t>2/23/2019</a:t>
+              <a:t>2/24/2019</a:t>
             </a:fld>
             <a:endParaRPr lang="en-US"/>
           </a:p>
@@ -4485,7 +4486,7 @@
           <a:p>
             <a:fld id="{99EF30BF-B2AF-40A2-882C-4069CB9E54A2}" type="datetimeFigureOut">
               <a:rPr lang="en-US" smtClean="0"/>
-              <a:t>2/23/2019</a:t>
+              <a:t>2/24/2019</a:t>
             </a:fld>
             <a:endParaRPr lang="en-US"/>
           </a:p>
@@ -4580,7 +4581,7 @@
           <a:p>
             <a:fld id="{99EF30BF-B2AF-40A2-882C-4069CB9E54A2}" type="datetimeFigureOut">
               <a:rPr lang="en-US" smtClean="0"/>
-              <a:t>2/23/2019</a:t>
+              <a:t>2/24/2019</a:t>
             </a:fld>
             <a:endParaRPr lang="en-US"/>
           </a:p>
@@ -4835,7 +4836,7 @@
           <a:p>
             <a:fld id="{99EF30BF-B2AF-40A2-882C-4069CB9E54A2}" type="datetimeFigureOut">
               <a:rPr lang="en-US" smtClean="0"/>
-              <a:t>2/23/2019</a:t>
+              <a:t>2/24/2019</a:t>
             </a:fld>
             <a:endParaRPr lang="en-US"/>
           </a:p>
@@ -5098,7 +5099,7 @@
           <a:p>
             <a:fld id="{99EF30BF-B2AF-40A2-882C-4069CB9E54A2}" type="datetimeFigureOut">
               <a:rPr lang="en-US" smtClean="0"/>
-              <a:t>2/23/2019</a:t>
+              <a:t>2/24/2019</a:t>
             </a:fld>
             <a:endParaRPr lang="en-US"/>
           </a:p>
@@ -5841,7 +5842,7 @@
           <a:p>
             <a:fld id="{99EF30BF-B2AF-40A2-882C-4069CB9E54A2}" type="datetimeFigureOut">
               <a:rPr lang="en-US" smtClean="0"/>
-              <a:t>2/23/2019</a:t>
+              <a:t>2/24/2019</a:t>
             </a:fld>
             <a:endParaRPr lang="en-US"/>
           </a:p>
@@ -6872,54 +6873,6 @@
           </a:p>
         </p:txBody>
       </p:sp>
-      <p:pic>
-        <p:nvPicPr>
-          <p:cNvPr id="7" name="Content Placeholder 6">
-            <a:extLst>
-              <a:ext uri="{FF2B5EF4-FFF2-40B4-BE49-F238E27FC236}">
-                <a16:creationId xmlns:a16="http://schemas.microsoft.com/office/drawing/2014/main" id="{2D5D88EE-F0FF-4155-94C6-C1D4B0200B2B}"/>
-              </a:ext>
-            </a:extLst>
-          </p:cNvPr>
-          <p:cNvPicPr>
-            <a:picLocks noGrp="1" noChangeAspect="1"/>
-          </p:cNvPicPr>
-          <p:nvPr>
-            <p:ph idx="1"/>
-          </p:nvPr>
-        </p:nvPicPr>
-        <p:blipFill>
-          <a:blip r:embed="rId3">
-            <a:extLst>
-              <a:ext uri="{28A0092B-C50C-407E-A947-70E740481C1C}">
-                <a14:useLocalDpi xmlns:a14="http://schemas.microsoft.com/office/drawing/2010/main" val="0"/>
-              </a:ext>
-            </a:extLst>
-          </a:blip>
-          <a:stretch>
-            <a:fillRect/>
-          </a:stretch>
-        </p:blipFill>
-        <p:spPr bwMode="auto">
-          <a:xfrm>
-            <a:off x="4717770" y="2256742"/>
-            <a:ext cx="4877481" cy="3143689"/>
-          </a:xfrm>
-          <a:prstGeom prst="rect">
-            <a:avLst/>
-          </a:prstGeom>
-          <a:noFill/>
-          <a:extLst>
-            <a:ext uri="{909E8E84-426E-40DD-AFC4-6F175D3DCCD1}">
-              <a14:hiddenFill xmlns:a14="http://schemas.microsoft.com/office/drawing/2010/main">
-                <a:solidFill>
-                  <a:srgbClr val="FFFFFF"/>
-                </a:solidFill>
-              </a14:hiddenFill>
-            </a:ext>
-          </a:extLst>
-        </p:spPr>
-      </p:pic>
       <p:sp>
         <p:nvSpPr>
           <p:cNvPr id="5" name="AutoShape 4" descr="https://attachments.office.net/owa/jpartee@smu365.mail.onmicrosoft.com/service.svc/s/GetFileAttachment?id=AAMkAGU1YzFlMGZjLWRmOWMtNGM3ZC1hYWQxLTgwMDlhNmY3ODE3MQBGAAAAAAB%2BjmxuFN2wSrjvH6E3eTuYBwAuDAiiV1ERQLL6iN7zTFIqAAAAAAEJAAAuDAiiV1ERQLL6iN7zTFIqAAAwDBNbAAABEgAQACTd63pBYr5AqUR4XAnONOc%3D&amp;X-OWA-CANARY=krAts1JqVkOvOqLQyeKB6bBqg6UymdYYMHRiDx5fK2s3IUMe0arnECTXH25rDvkeSggCZ8zvFlc.&amp;token=null&amp;owa=outlook.office.com&amp;isImagePreview=True">
@@ -6965,6 +6918,107 @@
           </a:p>
         </p:txBody>
       </p:sp>
+      <p:sp>
+        <p:nvSpPr>
+          <p:cNvPr id="4" name="Content Placeholder 3">
+            <a:extLst>
+              <a:ext uri="{FF2B5EF4-FFF2-40B4-BE49-F238E27FC236}">
+                <a16:creationId xmlns:a16="http://schemas.microsoft.com/office/drawing/2014/main" id="{CFBD466D-FA0E-4C43-BFF4-9C780F0FA02D}"/>
+              </a:ext>
+            </a:extLst>
+          </p:cNvPr>
+          <p:cNvSpPr>
+            <a:spLocks noGrp="1"/>
+          </p:cNvSpPr>
+          <p:nvPr>
+            <p:ph idx="1"/>
+          </p:nvPr>
+        </p:nvSpPr>
+        <p:spPr/>
+        <p:txBody>
+          <a:bodyPr/>
+          <a:lstStyle/>
+          <a:p>
+            <a:endParaRPr lang="en-US"/>
+          </a:p>
+        </p:txBody>
+      </p:sp>
+      <p:pic>
+        <p:nvPicPr>
+          <p:cNvPr id="1026" name="Picture 2">
+            <a:extLst>
+              <a:ext uri="{FF2B5EF4-FFF2-40B4-BE49-F238E27FC236}">
+                <a16:creationId xmlns:a16="http://schemas.microsoft.com/office/drawing/2014/main" id="{5E2B1000-B376-4381-AB46-28D0779DD774}"/>
+              </a:ext>
+            </a:extLst>
+          </p:cNvPr>
+          <p:cNvPicPr>
+            <a:picLocks noChangeAspect="1" noChangeArrowheads="1"/>
+          </p:cNvPicPr>
+          <p:nvPr/>
+        </p:nvPicPr>
+        <p:blipFill>
+          <a:blip r:embed="rId3">
+            <a:extLst>
+              <a:ext uri="{28A0092B-C50C-407E-A947-70E740481C1C}">
+                <a14:useLocalDpi xmlns:a14="http://schemas.microsoft.com/office/drawing/2010/main" val="0"/>
+              </a:ext>
+            </a:extLst>
+          </a:blip>
+          <a:srcRect/>
+          <a:stretch>
+            <a:fillRect/>
+          </a:stretch>
+        </p:blipFill>
+        <p:spPr bwMode="auto">
+          <a:xfrm>
+            <a:off x="161198" y="2140440"/>
+            <a:ext cx="5029200" cy="3200400"/>
+          </a:xfrm>
+          <a:prstGeom prst="rect">
+            <a:avLst/>
+          </a:prstGeom>
+          <a:noFill/>
+        </p:spPr>
+      </p:pic>
+      <p:pic>
+        <p:nvPicPr>
+          <p:cNvPr id="1028" name="Picture 4">
+            <a:extLst>
+              <a:ext uri="{FF2B5EF4-FFF2-40B4-BE49-F238E27FC236}">
+                <a16:creationId xmlns:a16="http://schemas.microsoft.com/office/drawing/2014/main" id="{C02CF098-AF95-4610-A70F-C69512429CB0}"/>
+              </a:ext>
+            </a:extLst>
+          </p:cNvPr>
+          <p:cNvPicPr>
+            <a:picLocks noChangeAspect="1" noChangeArrowheads="1"/>
+          </p:cNvPicPr>
+          <p:nvPr/>
+        </p:nvPicPr>
+        <p:blipFill>
+          <a:blip r:embed="rId4">
+            <a:extLst>
+              <a:ext uri="{28A0092B-C50C-407E-A947-70E740481C1C}">
+                <a14:useLocalDpi xmlns:a14="http://schemas.microsoft.com/office/drawing/2010/main" val="0"/>
+              </a:ext>
+            </a:extLst>
+          </a:blip>
+          <a:srcRect/>
+          <a:stretch>
+            <a:fillRect/>
+          </a:stretch>
+        </p:blipFill>
+        <p:spPr bwMode="auto">
+          <a:xfrm>
+            <a:off x="5152618" y="2140440"/>
+            <a:ext cx="5029200" cy="3200400"/>
+          </a:xfrm>
+          <a:prstGeom prst="rect">
+            <a:avLst/>
+          </a:prstGeom>
+          <a:noFill/>
+        </p:spPr>
+      </p:pic>
     </p:spTree>
     <p:extLst>
       <p:ext uri="{BB962C8B-B14F-4D97-AF65-F5344CB8AC3E}">
@@ -7018,36 +7072,41 @@
           <a:p>
             <a:r>
               <a:rPr lang="en-US" dirty="0"/>
-              <a:t>Question 5: Which state has the highest ABV and most bitter beer?</a:t>
-            </a:r>
-          </a:p>
-        </p:txBody>
-      </p:sp>
-      <p:sp>
-        <p:nvSpPr>
-          <p:cNvPr id="3" name="Content Placeholder 2">
+              <a:t>Question 5: Which state has the highest ABV?</a:t>
+            </a:r>
+          </a:p>
+        </p:txBody>
+      </p:sp>
+      <p:pic>
+        <p:nvPicPr>
+          <p:cNvPr id="4" name="Picture 3">
             <a:extLst>
               <a:ext uri="{FF2B5EF4-FFF2-40B4-BE49-F238E27FC236}">
-                <a16:creationId xmlns:a16="http://schemas.microsoft.com/office/drawing/2014/main" id="{8D94B764-0157-444C-9E71-36DACBD660A7}"/>
+                <a16:creationId xmlns:a16="http://schemas.microsoft.com/office/drawing/2014/main" id="{A964F3BE-A16B-4C0E-BC01-75F76702FB44}"/>
               </a:ext>
             </a:extLst>
           </p:cNvPr>
-          <p:cNvSpPr>
-            <a:spLocks noGrp="1"/>
-          </p:cNvSpPr>
-          <p:nvPr>
-            <p:ph idx="1"/>
-          </p:nvPr>
-        </p:nvSpPr>
-        <p:spPr/>
-        <p:txBody>
-          <a:bodyPr/>
-          <a:lstStyle/>
-          <a:p>
-            <a:endParaRPr lang="en-US"/>
-          </a:p>
-        </p:txBody>
-      </p:sp>
+          <p:cNvPicPr>
+            <a:picLocks noChangeAspect="1"/>
+          </p:cNvPicPr>
+          <p:nvPr/>
+        </p:nvPicPr>
+        <p:blipFill>
+          <a:blip r:embed="rId2"/>
+          <a:stretch>
+            <a:fillRect/>
+          </a:stretch>
+        </p:blipFill>
+        <p:spPr>
+          <a:xfrm>
+            <a:off x="560830" y="2392241"/>
+            <a:ext cx="8829675" cy="3181350"/>
+          </a:xfrm>
+          <a:prstGeom prst="rect">
+            <a:avLst/>
+          </a:prstGeom>
+        </p:spPr>
+      </p:pic>
     </p:spTree>
     <p:extLst>
       <p:ext uri="{BB962C8B-B14F-4D97-AF65-F5344CB8AC3E}">
@@ -7083,7 +7142,7 @@
           <p:cNvPr id="2" name="Title 1">
             <a:extLst>
               <a:ext uri="{FF2B5EF4-FFF2-40B4-BE49-F238E27FC236}">
-                <a16:creationId xmlns:a16="http://schemas.microsoft.com/office/drawing/2014/main" id="{3DD4D517-6115-4792-A0BE-F74004904FA2}"/>
+                <a16:creationId xmlns:a16="http://schemas.microsoft.com/office/drawing/2014/main" id="{0F5B77CB-9F85-44EB-BABE-AA934C522C44}"/>
               </a:ext>
             </a:extLst>
           </p:cNvPr>
@@ -7101,52 +7160,45 @@
           <a:p>
             <a:r>
               <a:rPr lang="en-US" dirty="0"/>
-              <a:t>Question 6: What does ABV look like?</a:t>
-            </a:r>
-          </a:p>
-        </p:txBody>
-      </p:sp>
-      <p:sp>
-        <p:nvSpPr>
-          <p:cNvPr id="3" name="Content Placeholder 2">
+              <a:t>Question 5: Which state has the highest IBU?</a:t>
+            </a:r>
+          </a:p>
+        </p:txBody>
+      </p:sp>
+      <p:pic>
+        <p:nvPicPr>
+          <p:cNvPr id="4" name="Picture 3">
             <a:extLst>
               <a:ext uri="{FF2B5EF4-FFF2-40B4-BE49-F238E27FC236}">
-                <a16:creationId xmlns:a16="http://schemas.microsoft.com/office/drawing/2014/main" id="{AA103BB0-5765-4043-930A-0BAD0C85239A}"/>
+                <a16:creationId xmlns:a16="http://schemas.microsoft.com/office/drawing/2014/main" id="{FC68D6B6-68E4-4F11-B7B7-7EAEED7D1FE0}"/>
               </a:ext>
             </a:extLst>
           </p:cNvPr>
-          <p:cNvSpPr>
-            <a:spLocks noGrp="1"/>
-          </p:cNvSpPr>
-          <p:nvPr>
-            <p:ph idx="1"/>
-          </p:nvPr>
-        </p:nvSpPr>
-        <p:spPr/>
-        <p:txBody>
-          <a:bodyPr/>
-          <a:lstStyle/>
-          <a:p>
-            <a:r>
-              <a:rPr lang="en-US" dirty="0"/>
-              <a:t>&lt;summary statistics&gt;</a:t>
-            </a:r>
-          </a:p>
-          <a:p>
-            <a:endParaRPr lang="en-US" dirty="0"/>
-          </a:p>
-          <a:p>
-            <a:r>
-              <a:rPr lang="en-US" dirty="0"/>
-              <a:t>….Histogram? Not requested, but would be more useful than stats I think</a:t>
-            </a:r>
-          </a:p>
-        </p:txBody>
-      </p:sp>
+          <p:cNvPicPr>
+            <a:picLocks noChangeAspect="1"/>
+          </p:cNvPicPr>
+          <p:nvPr/>
+        </p:nvPicPr>
+        <p:blipFill>
+          <a:blip r:embed="rId2"/>
+          <a:stretch>
+            <a:fillRect/>
+          </a:stretch>
+        </p:blipFill>
+        <p:spPr>
+          <a:xfrm>
+            <a:off x="463377" y="2068390"/>
+            <a:ext cx="8810625" cy="3143250"/>
+          </a:xfrm>
+          <a:prstGeom prst="rect">
+            <a:avLst/>
+          </a:prstGeom>
+        </p:spPr>
+      </p:pic>
     </p:spTree>
     <p:extLst>
       <p:ext uri="{BB962C8B-B14F-4D97-AF65-F5344CB8AC3E}">
-        <p14:creationId xmlns:p14="http://schemas.microsoft.com/office/powerpoint/2010/main" val="1890548231"/>
+        <p14:creationId xmlns:p14="http://schemas.microsoft.com/office/powerpoint/2010/main" val="4281845300"/>
       </p:ext>
     </p:extLst>
   </p:cSld>
@@ -7178,6 +7230,141 @@
           <p:cNvPr id="2" name="Title 1">
             <a:extLst>
               <a:ext uri="{FF2B5EF4-FFF2-40B4-BE49-F238E27FC236}">
+                <a16:creationId xmlns:a16="http://schemas.microsoft.com/office/drawing/2014/main" id="{3DD4D517-6115-4792-A0BE-F74004904FA2}"/>
+              </a:ext>
+            </a:extLst>
+          </p:cNvPr>
+          <p:cNvSpPr>
+            <a:spLocks noGrp="1"/>
+          </p:cNvSpPr>
+          <p:nvPr>
+            <p:ph type="title"/>
+          </p:nvPr>
+        </p:nvSpPr>
+        <p:spPr/>
+        <p:txBody>
+          <a:bodyPr/>
+          <a:lstStyle/>
+          <a:p>
+            <a:r>
+              <a:rPr lang="en-US" dirty="0"/>
+              <a:t>Question 6: What does ABV look like?</a:t>
+            </a:r>
+          </a:p>
+        </p:txBody>
+      </p:sp>
+      <p:pic>
+        <p:nvPicPr>
+          <p:cNvPr id="8" name="Picture 7">
+            <a:extLst>
+              <a:ext uri="{FF2B5EF4-FFF2-40B4-BE49-F238E27FC236}">
+                <a16:creationId xmlns:a16="http://schemas.microsoft.com/office/drawing/2014/main" id="{3DFE440D-815E-48CF-BCB3-613212507796}"/>
+              </a:ext>
+            </a:extLst>
+          </p:cNvPr>
+          <p:cNvPicPr>
+            <a:picLocks noChangeAspect="1"/>
+          </p:cNvPicPr>
+          <p:nvPr/>
+        </p:nvPicPr>
+        <p:blipFill>
+          <a:blip r:embed="rId2"/>
+          <a:stretch>
+            <a:fillRect/>
+          </a:stretch>
+        </p:blipFill>
+        <p:spPr>
+          <a:xfrm>
+            <a:off x="2808730" y="1281663"/>
+            <a:ext cx="4333875" cy="485775"/>
+          </a:xfrm>
+          <a:prstGeom prst="rect">
+            <a:avLst/>
+          </a:prstGeom>
+        </p:spPr>
+      </p:pic>
+      <p:pic>
+        <p:nvPicPr>
+          <p:cNvPr id="2052" name="Picture 4">
+            <a:extLst>
+              <a:ext uri="{FF2B5EF4-FFF2-40B4-BE49-F238E27FC236}">
+                <a16:creationId xmlns:a16="http://schemas.microsoft.com/office/drawing/2014/main" id="{CBD5C4B6-A397-416F-9B8C-C5A6CD43A10E}"/>
+              </a:ext>
+            </a:extLst>
+          </p:cNvPr>
+          <p:cNvPicPr>
+            <a:picLocks noChangeAspect="1" noChangeArrowheads="1"/>
+          </p:cNvPicPr>
+          <p:nvPr/>
+        </p:nvPicPr>
+        <p:blipFill>
+          <a:blip r:embed="rId3">
+            <a:extLst>
+              <a:ext uri="{28A0092B-C50C-407E-A947-70E740481C1C}">
+                <a14:useLocalDpi xmlns:a14="http://schemas.microsoft.com/office/drawing/2010/main" val="0"/>
+              </a:ext>
+            </a:extLst>
+          </a:blip>
+          <a:srcRect/>
+          <a:stretch>
+            <a:fillRect/>
+          </a:stretch>
+        </p:blipFill>
+        <p:spPr bwMode="auto">
+          <a:xfrm>
+            <a:off x="1875693" y="2160589"/>
+            <a:ext cx="5844372" cy="3719146"/>
+          </a:xfrm>
+          <a:prstGeom prst="rect">
+            <a:avLst/>
+          </a:prstGeom>
+          <a:noFill/>
+          <a:extLst>
+            <a:ext uri="{909E8E84-426E-40DD-AFC4-6F175D3DCCD1}">
+              <a14:hiddenFill xmlns:a14="http://schemas.microsoft.com/office/drawing/2010/main">
+                <a:solidFill>
+                  <a:srgbClr val="FFFFFF"/>
+                </a:solidFill>
+              </a14:hiddenFill>
+            </a:ext>
+          </a:extLst>
+        </p:spPr>
+      </p:pic>
+    </p:spTree>
+    <p:extLst>
+      <p:ext uri="{BB962C8B-B14F-4D97-AF65-F5344CB8AC3E}">
+        <p14:creationId xmlns:p14="http://schemas.microsoft.com/office/powerpoint/2010/main" val="1890548231"/>
+      </p:ext>
+    </p:extLst>
+  </p:cSld>
+  <p:clrMapOvr>
+    <a:masterClrMapping/>
+  </p:clrMapOvr>
+</p:sld>
+</file>
+
+<file path=ppt/slides/slide17.xml><?xml version="1.0" encoding="utf-8"?>
+<p:sld xmlns:a="http://schemas.openxmlformats.org/drawingml/2006/main" xmlns:r="http://schemas.openxmlformats.org/officeDocument/2006/relationships" xmlns:p="http://schemas.openxmlformats.org/presentationml/2006/main">
+  <p:cSld>
+    <p:spTree>
+      <p:nvGrpSpPr>
+        <p:cNvPr id="1" name=""/>
+        <p:cNvGrpSpPr/>
+        <p:nvPr/>
+      </p:nvGrpSpPr>
+      <p:grpSpPr>
+        <a:xfrm>
+          <a:off x="0" y="0"/>
+          <a:ext cx="0" cy="0"/>
+          <a:chOff x="0" y="0"/>
+          <a:chExt cx="0" cy="0"/>
+        </a:xfrm>
+      </p:grpSpPr>
+      <p:sp>
+        <p:nvSpPr>
+          <p:cNvPr id="2" name="Title 1">
+            <a:extLst>
+              <a:ext uri="{FF2B5EF4-FFF2-40B4-BE49-F238E27FC236}">
                 <a16:creationId xmlns:a16="http://schemas.microsoft.com/office/drawing/2014/main" id="{673C857C-FC3F-4961-94F9-3862F6BFE055}"/>
               </a:ext>
             </a:extLst>
@@ -7189,7 +7376,12 @@
             <p:ph type="title"/>
           </p:nvPr>
         </p:nvSpPr>
-        <p:spPr/>
+        <p:spPr>
+          <a:xfrm>
+            <a:off x="677334" y="609600"/>
+            <a:ext cx="8596668" cy="1320800"/>
+          </a:xfrm>
+        </p:spPr>
         <p:txBody>
           <a:bodyPr/>
           <a:lstStyle/>
@@ -7201,43 +7393,53 @@
           </a:p>
         </p:txBody>
       </p:sp>
-      <p:sp>
-        <p:nvSpPr>
-          <p:cNvPr id="3" name="Content Placeholder 2">
+      <p:pic>
+        <p:nvPicPr>
+          <p:cNvPr id="3076" name="Picture 4">
             <a:extLst>
               <a:ext uri="{FF2B5EF4-FFF2-40B4-BE49-F238E27FC236}">
-                <a16:creationId xmlns:a16="http://schemas.microsoft.com/office/drawing/2014/main" id="{C94A964E-229D-4226-9021-F93CB0B56722}"/>
+                <a16:creationId xmlns:a16="http://schemas.microsoft.com/office/drawing/2014/main" id="{140CDC69-BDBB-4B29-A16B-B57A3E6B0150}"/>
               </a:ext>
             </a:extLst>
           </p:cNvPr>
-          <p:cNvSpPr>
-            <a:spLocks noGrp="1"/>
-          </p:cNvSpPr>
-          <p:nvPr>
-            <p:ph idx="1"/>
-          </p:nvPr>
-        </p:nvSpPr>
-        <p:spPr/>
-        <p:txBody>
-          <a:bodyPr/>
-          <a:lstStyle/>
-          <a:p>
-            <a:r>
-              <a:rPr lang="en-US" dirty="0"/>
-              <a:t>&lt;Scatter plot&gt;</a:t>
-            </a:r>
-          </a:p>
-          <a:p>
-            <a:endParaRPr lang="en-US" dirty="0"/>
-          </a:p>
-          <a:p>
-            <a:r>
-              <a:rPr lang="en-US" dirty="0"/>
-              <a:t>Should we do a linear model and give a fit percentage and all? Might as well, it’s easy in R.</a:t>
-            </a:r>
-          </a:p>
-        </p:txBody>
-      </p:sp>
+          <p:cNvPicPr>
+            <a:picLocks noChangeAspect="1" noChangeArrowheads="1"/>
+          </p:cNvPicPr>
+          <p:nvPr/>
+        </p:nvPicPr>
+        <p:blipFill>
+          <a:blip r:embed="rId2">
+            <a:extLst>
+              <a:ext uri="{28A0092B-C50C-407E-A947-70E740481C1C}">
+                <a14:useLocalDpi xmlns:a14="http://schemas.microsoft.com/office/drawing/2010/main" val="0"/>
+              </a:ext>
+            </a:extLst>
+          </a:blip>
+          <a:srcRect/>
+          <a:stretch>
+            <a:fillRect/>
+          </a:stretch>
+        </p:blipFill>
+        <p:spPr bwMode="auto">
+          <a:xfrm>
+            <a:off x="565638" y="1811482"/>
+            <a:ext cx="7488115" cy="4765164"/>
+          </a:xfrm>
+          <a:prstGeom prst="rect">
+            <a:avLst/>
+          </a:prstGeom>
+          <a:noFill/>
+          <a:extLst>
+            <a:ext uri="{909E8E84-426E-40DD-AFC4-6F175D3DCCD1}">
+              <a14:hiddenFill xmlns:a14="http://schemas.microsoft.com/office/drawing/2010/main">
+                <a:solidFill>
+                  <a:srgbClr val="FFFFFF"/>
+                </a:solidFill>
+              </a14:hiddenFill>
+            </a:ext>
+          </a:extLst>
+        </p:spPr>
+      </p:pic>
     </p:spTree>
     <p:extLst>
       <p:ext uri="{BB962C8B-B14F-4D97-AF65-F5344CB8AC3E}">
@@ -7251,7 +7453,7 @@
 </p:sld>
 </file>
 
-<file path=ppt/slides/slide17.xml><?xml version="1.0" encoding="utf-8"?>
+<file path=ppt/slides/slide18.xml><?xml version="1.0" encoding="utf-8"?>
 <p:sld xmlns:a="http://schemas.openxmlformats.org/drawingml/2006/main" xmlns:r="http://schemas.openxmlformats.org/officeDocument/2006/relationships" xmlns:p="http://schemas.openxmlformats.org/presentationml/2006/main">
   <p:cSld>
     <p:spTree>

</xml_diff>

<commit_message>
adding nearly finalized presentation, need to update with relative distribution
</commit_message>
<xml_diff>
--- a/Breweries and Beer Study.pptx
+++ b/Breweries and Beer Study.pptx
@@ -20,9 +20,9 @@
     <p:sldId id="265" r:id="rId11"/>
     <p:sldId id="266" r:id="rId12"/>
     <p:sldId id="267" r:id="rId13"/>
-    <p:sldId id="268" r:id="rId14"/>
-    <p:sldId id="269" r:id="rId15"/>
-    <p:sldId id="273" r:id="rId16"/>
+    <p:sldId id="273" r:id="rId14"/>
+    <p:sldId id="268" r:id="rId15"/>
+    <p:sldId id="269" r:id="rId16"/>
     <p:sldId id="270" r:id="rId17"/>
     <p:sldId id="271" r:id="rId18"/>
     <p:sldId id="272" r:id="rId19"/>
@@ -546,7 +546,7 @@
           <a:p>
             <a:fld id="{CC40ABAD-A3F6-46BE-8C15-16F397FA38B2}" type="slidenum">
               <a:rPr lang="en-US" smtClean="0"/>
-              <a:t>11</a:t>
+              <a:t>2</a:t>
             </a:fld>
             <a:endParaRPr lang="en-US"/>
           </a:p>
@@ -555,7 +555,7 @@
     </p:spTree>
     <p:extLst>
       <p:ext uri="{BB962C8B-B14F-4D97-AF65-F5344CB8AC3E}">
-        <p14:creationId xmlns:p14="http://schemas.microsoft.com/office/powerpoint/2010/main" val="4125599644"/>
+        <p14:creationId xmlns:p14="http://schemas.microsoft.com/office/powerpoint/2010/main" val="2128637537"/>
       </p:ext>
     </p:extLst>
   </p:cSld>
@@ -630,7 +630,259 @@
           <a:p>
             <a:fld id="{CC40ABAD-A3F6-46BE-8C15-16F397FA38B2}" type="slidenum">
               <a:rPr lang="en-US" smtClean="0"/>
+              <a:t>9</a:t>
+            </a:fld>
+            <a:endParaRPr lang="en-US"/>
+          </a:p>
+        </p:txBody>
+      </p:sp>
+    </p:spTree>
+    <p:extLst>
+      <p:ext uri="{BB962C8B-B14F-4D97-AF65-F5344CB8AC3E}">
+        <p14:creationId xmlns:p14="http://schemas.microsoft.com/office/powerpoint/2010/main" val="612351599"/>
+      </p:ext>
+    </p:extLst>
+  </p:cSld>
+  <p:clrMapOvr>
+    <a:masterClrMapping/>
+  </p:clrMapOvr>
+</p:notes>
+</file>
+
+<file path=ppt/notesSlides/notesSlide3.xml><?xml version="1.0" encoding="utf-8"?>
+<p:notes xmlns:a="http://schemas.openxmlformats.org/drawingml/2006/main" xmlns:r="http://schemas.openxmlformats.org/officeDocument/2006/relationships" xmlns:p="http://schemas.openxmlformats.org/presentationml/2006/main">
+  <p:cSld>
+    <p:spTree>
+      <p:nvGrpSpPr>
+        <p:cNvPr id="1" name=""/>
+        <p:cNvGrpSpPr/>
+        <p:nvPr/>
+      </p:nvGrpSpPr>
+      <p:grpSpPr>
+        <a:xfrm>
+          <a:off x="0" y="0"/>
+          <a:ext cx="0" cy="0"/>
+          <a:chOff x="0" y="0"/>
+          <a:chExt cx="0" cy="0"/>
+        </a:xfrm>
+      </p:grpSpPr>
+      <p:sp>
+        <p:nvSpPr>
+          <p:cNvPr id="2" name="Slide Image Placeholder 1"/>
+          <p:cNvSpPr>
+            <a:spLocks noGrp="1" noRot="1" noChangeAspect="1"/>
+          </p:cNvSpPr>
+          <p:nvPr>
+            <p:ph type="sldImg"/>
+          </p:nvPr>
+        </p:nvSpPr>
+        <p:spPr/>
+      </p:sp>
+      <p:sp>
+        <p:nvSpPr>
+          <p:cNvPr id="3" name="Notes Placeholder 2"/>
+          <p:cNvSpPr>
+            <a:spLocks noGrp="1"/>
+          </p:cNvSpPr>
+          <p:nvPr>
+            <p:ph type="body" idx="1"/>
+          </p:nvPr>
+        </p:nvSpPr>
+        <p:spPr/>
+        <p:txBody>
+          <a:bodyPr/>
+          <a:lstStyle/>
+          <a:p>
+            <a:endParaRPr lang="en-US" dirty="0"/>
+          </a:p>
+        </p:txBody>
+      </p:sp>
+      <p:sp>
+        <p:nvSpPr>
+          <p:cNvPr id="4" name="Slide Number Placeholder 3"/>
+          <p:cNvSpPr>
+            <a:spLocks noGrp="1"/>
+          </p:cNvSpPr>
+          <p:nvPr>
+            <p:ph type="sldNum" sz="quarter" idx="5"/>
+          </p:nvPr>
+        </p:nvSpPr>
+        <p:spPr/>
+        <p:txBody>
+          <a:bodyPr/>
+          <a:lstStyle/>
+          <a:p>
+            <a:fld id="{CC40ABAD-A3F6-46BE-8C15-16F397FA38B2}" type="slidenum">
+              <a:rPr lang="en-US" smtClean="0"/>
+              <a:t>11</a:t>
+            </a:fld>
+            <a:endParaRPr lang="en-US"/>
+          </a:p>
+        </p:txBody>
+      </p:sp>
+    </p:spTree>
+    <p:extLst>
+      <p:ext uri="{BB962C8B-B14F-4D97-AF65-F5344CB8AC3E}">
+        <p14:creationId xmlns:p14="http://schemas.microsoft.com/office/powerpoint/2010/main" val="4125599644"/>
+      </p:ext>
+    </p:extLst>
+  </p:cSld>
+  <p:clrMapOvr>
+    <a:masterClrMapping/>
+  </p:clrMapOvr>
+</p:notes>
+</file>
+
+<file path=ppt/notesSlides/notesSlide4.xml><?xml version="1.0" encoding="utf-8"?>
+<p:notes xmlns:a="http://schemas.openxmlformats.org/drawingml/2006/main" xmlns:r="http://schemas.openxmlformats.org/officeDocument/2006/relationships" xmlns:p="http://schemas.openxmlformats.org/presentationml/2006/main">
+  <p:cSld>
+    <p:spTree>
+      <p:nvGrpSpPr>
+        <p:cNvPr id="1" name=""/>
+        <p:cNvGrpSpPr/>
+        <p:nvPr/>
+      </p:nvGrpSpPr>
+      <p:grpSpPr>
+        <a:xfrm>
+          <a:off x="0" y="0"/>
+          <a:ext cx="0" cy="0"/>
+          <a:chOff x="0" y="0"/>
+          <a:chExt cx="0" cy="0"/>
+        </a:xfrm>
+      </p:grpSpPr>
+      <p:sp>
+        <p:nvSpPr>
+          <p:cNvPr id="2" name="Slide Image Placeholder 1"/>
+          <p:cNvSpPr>
+            <a:spLocks noGrp="1" noRot="1" noChangeAspect="1"/>
+          </p:cNvSpPr>
+          <p:nvPr>
+            <p:ph type="sldImg"/>
+          </p:nvPr>
+        </p:nvSpPr>
+        <p:spPr/>
+      </p:sp>
+      <p:sp>
+        <p:nvSpPr>
+          <p:cNvPr id="3" name="Notes Placeholder 2"/>
+          <p:cNvSpPr>
+            <a:spLocks noGrp="1"/>
+          </p:cNvSpPr>
+          <p:nvPr>
+            <p:ph type="body" idx="1"/>
+          </p:nvPr>
+        </p:nvSpPr>
+        <p:spPr/>
+        <p:txBody>
+          <a:bodyPr/>
+          <a:lstStyle/>
+          <a:p>
+            <a:endParaRPr lang="en-US" dirty="0"/>
+          </a:p>
+        </p:txBody>
+      </p:sp>
+      <p:sp>
+        <p:nvSpPr>
+          <p:cNvPr id="4" name="Slide Number Placeholder 3"/>
+          <p:cNvSpPr>
+            <a:spLocks noGrp="1"/>
+          </p:cNvSpPr>
+          <p:nvPr>
+            <p:ph type="sldNum" sz="quarter" idx="5"/>
+          </p:nvPr>
+        </p:nvSpPr>
+        <p:spPr/>
+        <p:txBody>
+          <a:bodyPr/>
+          <a:lstStyle/>
+          <a:p>
+            <a:fld id="{CC40ABAD-A3F6-46BE-8C15-16F397FA38B2}" type="slidenum">
+              <a:rPr lang="en-US" smtClean="0"/>
               <a:t>13</a:t>
+            </a:fld>
+            <a:endParaRPr lang="en-US"/>
+          </a:p>
+        </p:txBody>
+      </p:sp>
+    </p:spTree>
+    <p:extLst>
+      <p:ext uri="{BB962C8B-B14F-4D97-AF65-F5344CB8AC3E}">
+        <p14:creationId xmlns:p14="http://schemas.microsoft.com/office/powerpoint/2010/main" val="3158548462"/>
+      </p:ext>
+    </p:extLst>
+  </p:cSld>
+  <p:clrMapOvr>
+    <a:masterClrMapping/>
+  </p:clrMapOvr>
+</p:notes>
+</file>
+
+<file path=ppt/notesSlides/notesSlide5.xml><?xml version="1.0" encoding="utf-8"?>
+<p:notes xmlns:a="http://schemas.openxmlformats.org/drawingml/2006/main" xmlns:r="http://schemas.openxmlformats.org/officeDocument/2006/relationships" xmlns:p="http://schemas.openxmlformats.org/presentationml/2006/main">
+  <p:cSld>
+    <p:spTree>
+      <p:nvGrpSpPr>
+        <p:cNvPr id="1" name=""/>
+        <p:cNvGrpSpPr/>
+        <p:nvPr/>
+      </p:nvGrpSpPr>
+      <p:grpSpPr>
+        <a:xfrm>
+          <a:off x="0" y="0"/>
+          <a:ext cx="0" cy="0"/>
+          <a:chOff x="0" y="0"/>
+          <a:chExt cx="0" cy="0"/>
+        </a:xfrm>
+      </p:grpSpPr>
+      <p:sp>
+        <p:nvSpPr>
+          <p:cNvPr id="2" name="Slide Image Placeholder 1"/>
+          <p:cNvSpPr>
+            <a:spLocks noGrp="1" noRot="1" noChangeAspect="1"/>
+          </p:cNvSpPr>
+          <p:nvPr>
+            <p:ph type="sldImg"/>
+          </p:nvPr>
+        </p:nvSpPr>
+        <p:spPr/>
+      </p:sp>
+      <p:sp>
+        <p:nvSpPr>
+          <p:cNvPr id="3" name="Notes Placeholder 2"/>
+          <p:cNvSpPr>
+            <a:spLocks noGrp="1"/>
+          </p:cNvSpPr>
+          <p:nvPr>
+            <p:ph type="body" idx="1"/>
+          </p:nvPr>
+        </p:nvSpPr>
+        <p:spPr/>
+        <p:txBody>
+          <a:bodyPr/>
+          <a:lstStyle/>
+          <a:p>
+            <a:endParaRPr lang="en-US" dirty="0"/>
+          </a:p>
+        </p:txBody>
+      </p:sp>
+      <p:sp>
+        <p:nvSpPr>
+          <p:cNvPr id="4" name="Slide Number Placeholder 3"/>
+          <p:cNvSpPr>
+            <a:spLocks noGrp="1"/>
+          </p:cNvSpPr>
+          <p:nvPr>
+            <p:ph type="sldNum" sz="quarter" idx="5"/>
+          </p:nvPr>
+        </p:nvSpPr>
+        <p:spPr/>
+        <p:txBody>
+          <a:bodyPr/>
+          <a:lstStyle/>
+          <a:p>
+            <a:fld id="{CC40ABAD-A3F6-46BE-8C15-16F397FA38B2}" type="slidenum">
+              <a:rPr lang="en-US" smtClean="0"/>
+              <a:t>14</a:t>
             </a:fld>
             <a:endParaRPr lang="en-US"/>
           </a:p>
@@ -6780,17 +7032,17 @@
           <a:p>
             <a:r>
               <a:rPr lang="en-US" dirty="0"/>
-              <a:t>We are tasked with finding some summary statistics on this data, so noting the completeness of the set is essential. There are missing values in ABV and IBU, see below.</a:t>
+              <a:t>We are tasked with finding some summary statistics on this data, so noting the completeness of the set is essential. There are 62 missing values in ABV and notably 1005 missing IBU values, see below.</a:t>
             </a:r>
           </a:p>
         </p:txBody>
       </p:sp>
       <p:pic>
         <p:nvPicPr>
-          <p:cNvPr id="4" name="Picture 3">
+          <p:cNvPr id="5" name="Picture 4">
             <a:extLst>
               <a:ext uri="{FF2B5EF4-FFF2-40B4-BE49-F238E27FC236}">
-                <a16:creationId xmlns:a16="http://schemas.microsoft.com/office/drawing/2014/main" id="{BC8C7715-C2EB-4D76-AF11-BA9A4FEB8121}"/>
+                <a16:creationId xmlns:a16="http://schemas.microsoft.com/office/drawing/2014/main" id="{8D45219D-949B-4DE1-9BFA-038AFD0B45CE}"/>
               </a:ext>
             </a:extLst>
           </p:cNvPr>
@@ -6807,8 +7059,8 @@
         </p:blipFill>
         <p:spPr>
           <a:xfrm>
-            <a:off x="2094355" y="3367550"/>
-            <a:ext cx="5762625" cy="1466850"/>
+            <a:off x="752620" y="3329169"/>
+            <a:ext cx="8143875" cy="2152650"/>
           </a:xfrm>
           <a:prstGeom prst="rect">
             <a:avLst/>
@@ -6912,31 +7164,6 @@
               <a:avLst/>
             </a:prstTxWarp>
           </a:bodyPr>
-          <a:lstStyle/>
-          <a:p>
-            <a:endParaRPr lang="en-US"/>
-          </a:p>
-        </p:txBody>
-      </p:sp>
-      <p:sp>
-        <p:nvSpPr>
-          <p:cNvPr id="4" name="Content Placeholder 3">
-            <a:extLst>
-              <a:ext uri="{FF2B5EF4-FFF2-40B4-BE49-F238E27FC236}">
-                <a16:creationId xmlns:a16="http://schemas.microsoft.com/office/drawing/2014/main" id="{CFBD466D-FA0E-4C43-BFF4-9C780F0FA02D}"/>
-              </a:ext>
-            </a:extLst>
-          </p:cNvPr>
-          <p:cNvSpPr>
-            <a:spLocks noGrp="1"/>
-          </p:cNvSpPr>
-          <p:nvPr>
-            <p:ph idx="1"/>
-          </p:nvPr>
-        </p:nvSpPr>
-        <p:spPr/>
-        <p:txBody>
-          <a:bodyPr/>
           <a:lstStyle/>
           <a:p>
             <a:endParaRPr lang="en-US"/>
@@ -7022,6 +7249,192 @@
     </p:spTree>
     <p:extLst>
       <p:ext uri="{BB962C8B-B14F-4D97-AF65-F5344CB8AC3E}">
+        <p14:creationId xmlns:p14="http://schemas.microsoft.com/office/powerpoint/2010/main" val="762713850"/>
+      </p:ext>
+    </p:extLst>
+  </p:cSld>
+  <p:clrMapOvr>
+    <a:masterClrMapping/>
+  </p:clrMapOvr>
+</p:sld>
+</file>
+
+<file path=ppt/slides/slide14.xml><?xml version="1.0" encoding="utf-8"?>
+<p:sld xmlns:a="http://schemas.openxmlformats.org/drawingml/2006/main" xmlns:r="http://schemas.openxmlformats.org/officeDocument/2006/relationships" xmlns:p="http://schemas.openxmlformats.org/presentationml/2006/main">
+  <p:cSld>
+    <p:spTree>
+      <p:nvGrpSpPr>
+        <p:cNvPr id="1" name=""/>
+        <p:cNvGrpSpPr/>
+        <p:nvPr/>
+      </p:nvGrpSpPr>
+      <p:grpSpPr>
+        <a:xfrm>
+          <a:off x="0" y="0"/>
+          <a:ext cx="0" cy="0"/>
+          <a:chOff x="0" y="0"/>
+          <a:chExt cx="0" cy="0"/>
+        </a:xfrm>
+      </p:grpSpPr>
+      <p:sp>
+        <p:nvSpPr>
+          <p:cNvPr id="2" name="Title 1">
+            <a:extLst>
+              <a:ext uri="{FF2B5EF4-FFF2-40B4-BE49-F238E27FC236}">
+                <a16:creationId xmlns:a16="http://schemas.microsoft.com/office/drawing/2014/main" id="{55892731-DF31-4E52-8219-91480F1EE78A}"/>
+              </a:ext>
+            </a:extLst>
+          </p:cNvPr>
+          <p:cNvSpPr>
+            <a:spLocks noGrp="1"/>
+          </p:cNvSpPr>
+          <p:nvPr>
+            <p:ph type="title"/>
+          </p:nvPr>
+        </p:nvSpPr>
+        <p:spPr/>
+        <p:txBody>
+          <a:bodyPr/>
+          <a:lstStyle/>
+          <a:p>
+            <a:r>
+              <a:rPr lang="en-US" dirty="0"/>
+              <a:t>Question 4: IBU /ABV by State</a:t>
+            </a:r>
+          </a:p>
+        </p:txBody>
+      </p:sp>
+      <p:pic>
+        <p:nvPicPr>
+          <p:cNvPr id="7" name="Content Placeholder 6">
+            <a:extLst>
+              <a:ext uri="{FF2B5EF4-FFF2-40B4-BE49-F238E27FC236}">
+                <a16:creationId xmlns:a16="http://schemas.microsoft.com/office/drawing/2014/main" id="{2D5D88EE-F0FF-4155-94C6-C1D4B0200B2B}"/>
+              </a:ext>
+            </a:extLst>
+          </p:cNvPr>
+          <p:cNvPicPr>
+            <a:picLocks noGrp="1" noChangeAspect="1"/>
+          </p:cNvPicPr>
+          <p:nvPr>
+            <p:ph idx="1"/>
+          </p:nvPr>
+        </p:nvPicPr>
+        <p:blipFill>
+          <a:blip r:embed="rId3">
+            <a:extLst>
+              <a:ext uri="{28A0092B-C50C-407E-A947-70E740481C1C}">
+                <a14:useLocalDpi xmlns:a14="http://schemas.microsoft.com/office/drawing/2010/main" val="0"/>
+              </a:ext>
+            </a:extLst>
+          </a:blip>
+          <a:stretch>
+            <a:fillRect/>
+          </a:stretch>
+        </p:blipFill>
+        <p:spPr bwMode="auto">
+          <a:xfrm>
+            <a:off x="947926" y="1270000"/>
+            <a:ext cx="8055483" cy="5192011"/>
+          </a:xfrm>
+          <a:prstGeom prst="rect">
+            <a:avLst/>
+          </a:prstGeom>
+          <a:noFill/>
+          <a:extLst>
+            <a:ext uri="{909E8E84-426E-40DD-AFC4-6F175D3DCCD1}">
+              <a14:hiddenFill xmlns:a14="http://schemas.microsoft.com/office/drawing/2010/main">
+                <a:solidFill>
+                  <a:srgbClr val="FFFFFF"/>
+                </a:solidFill>
+              </a14:hiddenFill>
+            </a:ext>
+          </a:extLst>
+        </p:spPr>
+      </p:pic>
+      <p:sp>
+        <p:nvSpPr>
+          <p:cNvPr id="5" name="AutoShape 4" descr="https://attachments.office.net/owa/jpartee@smu365.mail.onmicrosoft.com/service.svc/s/GetFileAttachment?id=AAMkAGU1YzFlMGZjLWRmOWMtNGM3ZC1hYWQxLTgwMDlhNmY3ODE3MQBGAAAAAAB%2BjmxuFN2wSrjvH6E3eTuYBwAuDAiiV1ERQLL6iN7zTFIqAAAAAAEJAAAuDAiiV1ERQLL6iN7zTFIqAAAwDBNbAAABEgAQACTd63pBYr5AqUR4XAnONOc%3D&amp;X-OWA-CANARY=krAts1JqVkOvOqLQyeKB6bBqg6UymdYYMHRiDx5fK2s3IUMe0arnECTXH25rDvkeSggCZ8zvFlc.&amp;token=null&amp;owa=outlook.office.com&amp;isImagePreview=True">
+            <a:extLst>
+              <a:ext uri="{FF2B5EF4-FFF2-40B4-BE49-F238E27FC236}">
+                <a16:creationId xmlns:a16="http://schemas.microsoft.com/office/drawing/2014/main" id="{1128CF2E-BC25-4405-ABAB-AD771641150C}"/>
+              </a:ext>
+            </a:extLst>
+          </p:cNvPr>
+          <p:cNvSpPr>
+            <a:spLocks noChangeAspect="1" noChangeArrowheads="1"/>
+          </p:cNvSpPr>
+          <p:nvPr/>
+        </p:nvSpPr>
+        <p:spPr bwMode="auto">
+          <a:xfrm>
+            <a:off x="-193431" y="-2860431"/>
+            <a:ext cx="6441831" cy="6441831"/>
+          </a:xfrm>
+          <a:prstGeom prst="rect">
+            <a:avLst/>
+          </a:prstGeom>
+          <a:noFill/>
+          <a:extLst>
+            <a:ext uri="{909E8E84-426E-40DD-AFC4-6F175D3DCCD1}">
+              <a14:hiddenFill xmlns:a14="http://schemas.microsoft.com/office/drawing/2010/main">
+                <a:solidFill>
+                  <a:srgbClr val="FFFFFF"/>
+                </a:solidFill>
+              </a14:hiddenFill>
+            </a:ext>
+          </a:extLst>
+        </p:spPr>
+        <p:txBody>
+          <a:bodyPr vert="horz" wrap="square" lIns="91440" tIns="45720" rIns="91440" bIns="45720" numCol="1" anchor="t" anchorCtr="0" compatLnSpc="1">
+            <a:prstTxWarp prst="textNoShape">
+              <a:avLst/>
+            </a:prstTxWarp>
+          </a:bodyPr>
+          <a:lstStyle/>
+          <a:p>
+            <a:endParaRPr lang="en-US"/>
+          </a:p>
+        </p:txBody>
+      </p:sp>
+      <p:sp>
+        <p:nvSpPr>
+          <p:cNvPr id="3" name="TextBox 2">
+            <a:extLst>
+              <a:ext uri="{FF2B5EF4-FFF2-40B4-BE49-F238E27FC236}">
+                <a16:creationId xmlns:a16="http://schemas.microsoft.com/office/drawing/2014/main" id="{FD31122E-D19D-4FED-A39F-629AC0E1A7AF}"/>
+              </a:ext>
+            </a:extLst>
+          </p:cNvPr>
+          <p:cNvSpPr txBox="1"/>
+          <p:nvPr/>
+        </p:nvSpPr>
+        <p:spPr>
+          <a:xfrm>
+            <a:off x="1703293" y="6488668"/>
+            <a:ext cx="6849035" cy="369332"/>
+          </a:xfrm>
+          <a:prstGeom prst="rect">
+            <a:avLst/>
+          </a:prstGeom>
+          <a:noFill/>
+        </p:spPr>
+        <p:txBody>
+          <a:bodyPr wrap="square" rtlCol="0">
+            <a:spAutoFit/>
+          </a:bodyPr>
+          <a:lstStyle/>
+          <a:p>
+            <a:r>
+              <a:rPr lang="en-US" dirty="0"/>
+              <a:t>* South Dakota has no median, only one brewery entry.</a:t>
+            </a:r>
+          </a:p>
+        </p:txBody>
+      </p:sp>
+    </p:spTree>
+    <p:extLst>
+      <p:ext uri="{BB962C8B-B14F-4D97-AF65-F5344CB8AC3E}">
         <p14:creationId xmlns:p14="http://schemas.microsoft.com/office/powerpoint/2010/main" val="3652578282"/>
       </p:ext>
     </p:extLst>
@@ -7032,7 +7445,7 @@
 </p:sld>
 </file>
 
-<file path=ppt/slides/slide14.xml><?xml version="1.0" encoding="utf-8"?>
+<file path=ppt/slides/slide15.xml><?xml version="1.0" encoding="utf-8"?>
 <p:sld xmlns:a="http://schemas.openxmlformats.org/drawingml/2006/main" xmlns:r="http://schemas.openxmlformats.org/officeDocument/2006/relationships" xmlns:p="http://schemas.openxmlformats.org/presentationml/2006/main">
   <p:cSld>
     <p:spTree>
@@ -7120,94 +7533,6 @@
 </p:sld>
 </file>
 
-<file path=ppt/slides/slide15.xml><?xml version="1.0" encoding="utf-8"?>
-<p:sld xmlns:a="http://schemas.openxmlformats.org/drawingml/2006/main" xmlns:r="http://schemas.openxmlformats.org/officeDocument/2006/relationships" xmlns:p="http://schemas.openxmlformats.org/presentationml/2006/main">
-  <p:cSld>
-    <p:spTree>
-      <p:nvGrpSpPr>
-        <p:cNvPr id="1" name=""/>
-        <p:cNvGrpSpPr/>
-        <p:nvPr/>
-      </p:nvGrpSpPr>
-      <p:grpSpPr>
-        <a:xfrm>
-          <a:off x="0" y="0"/>
-          <a:ext cx="0" cy="0"/>
-          <a:chOff x="0" y="0"/>
-          <a:chExt cx="0" cy="0"/>
-        </a:xfrm>
-      </p:grpSpPr>
-      <p:sp>
-        <p:nvSpPr>
-          <p:cNvPr id="2" name="Title 1">
-            <a:extLst>
-              <a:ext uri="{FF2B5EF4-FFF2-40B4-BE49-F238E27FC236}">
-                <a16:creationId xmlns:a16="http://schemas.microsoft.com/office/drawing/2014/main" id="{0F5B77CB-9F85-44EB-BABE-AA934C522C44}"/>
-              </a:ext>
-            </a:extLst>
-          </p:cNvPr>
-          <p:cNvSpPr>
-            <a:spLocks noGrp="1"/>
-          </p:cNvSpPr>
-          <p:nvPr>
-            <p:ph type="title"/>
-          </p:nvPr>
-        </p:nvSpPr>
-        <p:spPr/>
-        <p:txBody>
-          <a:bodyPr/>
-          <a:lstStyle/>
-          <a:p>
-            <a:r>
-              <a:rPr lang="en-US" dirty="0"/>
-              <a:t>Question 5: Which state has the highest IBU?</a:t>
-            </a:r>
-          </a:p>
-        </p:txBody>
-      </p:sp>
-      <p:pic>
-        <p:nvPicPr>
-          <p:cNvPr id="4" name="Picture 3">
-            <a:extLst>
-              <a:ext uri="{FF2B5EF4-FFF2-40B4-BE49-F238E27FC236}">
-                <a16:creationId xmlns:a16="http://schemas.microsoft.com/office/drawing/2014/main" id="{FC68D6B6-68E4-4F11-B7B7-7EAEED7D1FE0}"/>
-              </a:ext>
-            </a:extLst>
-          </p:cNvPr>
-          <p:cNvPicPr>
-            <a:picLocks noChangeAspect="1"/>
-          </p:cNvPicPr>
-          <p:nvPr/>
-        </p:nvPicPr>
-        <p:blipFill>
-          <a:blip r:embed="rId2"/>
-          <a:stretch>
-            <a:fillRect/>
-          </a:stretch>
-        </p:blipFill>
-        <p:spPr>
-          <a:xfrm>
-            <a:off x="463377" y="2068390"/>
-            <a:ext cx="8810625" cy="3143250"/>
-          </a:xfrm>
-          <a:prstGeom prst="rect">
-            <a:avLst/>
-          </a:prstGeom>
-        </p:spPr>
-      </p:pic>
-    </p:spTree>
-    <p:extLst>
-      <p:ext uri="{BB962C8B-B14F-4D97-AF65-F5344CB8AC3E}">
-        <p14:creationId xmlns:p14="http://schemas.microsoft.com/office/powerpoint/2010/main" val="4281845300"/>
-      </p:ext>
-    </p:extLst>
-  </p:cSld>
-  <p:clrMapOvr>
-    <a:masterClrMapping/>
-  </p:clrMapOvr>
-</p:sld>
-</file>
-
 <file path=ppt/slides/slide16.xml><?xml version="1.0" encoding="utf-8"?>
 <p:sld xmlns:a="http://schemas.openxmlformats.org/drawingml/2006/main" xmlns:r="http://schemas.openxmlformats.org/officeDocument/2006/relationships" xmlns:p="http://schemas.openxmlformats.org/presentationml/2006/main">
   <p:cSld>
@@ -7253,12 +7578,95 @@
           </a:p>
         </p:txBody>
       </p:sp>
+      <p:sp>
+        <p:nvSpPr>
+          <p:cNvPr id="3" name="Content Placeholder 2">
+            <a:extLst>
+              <a:ext uri="{FF2B5EF4-FFF2-40B4-BE49-F238E27FC236}">
+                <a16:creationId xmlns:a16="http://schemas.microsoft.com/office/drawing/2014/main" id="{AA103BB0-5765-4043-930A-0BAD0C85239A}"/>
+              </a:ext>
+            </a:extLst>
+          </p:cNvPr>
+          <p:cNvSpPr>
+            <a:spLocks noGrp="1"/>
+          </p:cNvSpPr>
+          <p:nvPr>
+            <p:ph idx="1"/>
+          </p:nvPr>
+        </p:nvSpPr>
+        <p:spPr>
+          <a:xfrm>
+            <a:off x="677334" y="1607696"/>
+            <a:ext cx="8596668" cy="3880773"/>
+          </a:xfrm>
+        </p:spPr>
+        <p:txBody>
+          <a:bodyPr/>
+          <a:lstStyle/>
+          <a:p>
+            <a:r>
+              <a:rPr lang="en-US" dirty="0"/>
+              <a:t>Summary of ABV</a:t>
+            </a:r>
+          </a:p>
+          <a:p>
+            <a:endParaRPr lang="en-US" dirty="0"/>
+          </a:p>
+          <a:p>
+            <a:endParaRPr lang="en-US" dirty="0"/>
+          </a:p>
+          <a:p>
+            <a:endParaRPr lang="en-US" dirty="0"/>
+          </a:p>
+          <a:p>
+            <a:endParaRPr lang="en-US" dirty="0"/>
+          </a:p>
+          <a:p>
+            <a:pPr marL="0" indent="0">
+              <a:buNone/>
+            </a:pPr>
+            <a:endParaRPr lang="en-US" dirty="0"/>
+          </a:p>
+          <a:p>
+            <a:endParaRPr lang="en-US" dirty="0"/>
+          </a:p>
+        </p:txBody>
+      </p:sp>
       <p:pic>
         <p:nvPicPr>
-          <p:cNvPr id="8" name="Picture 7">
+          <p:cNvPr id="5" name="Picture 4">
             <a:extLst>
               <a:ext uri="{FF2B5EF4-FFF2-40B4-BE49-F238E27FC236}">
-                <a16:creationId xmlns:a16="http://schemas.microsoft.com/office/drawing/2014/main" id="{3DFE440D-815E-48CF-BCB3-613212507796}"/>
+                <a16:creationId xmlns:a16="http://schemas.microsoft.com/office/drawing/2014/main" id="{47417CA5-A657-4DED-8FD0-9917DE4C1475}"/>
+              </a:ext>
+            </a:extLst>
+          </p:cNvPr>
+          <p:cNvPicPr>
+            <a:picLocks noChangeAspect="1"/>
+          </p:cNvPicPr>
+          <p:nvPr/>
+        </p:nvPicPr>
+        <p:blipFill rotWithShape="1">
+          <a:blip r:embed="rId2"/>
+          <a:srcRect t="50000"/>
+          <a:stretch/>
+        </p:blipFill>
+        <p:spPr>
+          <a:xfrm>
+            <a:off x="1587348" y="5472113"/>
+            <a:ext cx="5924550" cy="776287"/>
+          </a:xfrm>
+          <a:prstGeom prst="rect">
+            <a:avLst/>
+          </a:prstGeom>
+        </p:spPr>
+      </p:pic>
+      <p:pic>
+        <p:nvPicPr>
+          <p:cNvPr id="7" name="Picture 6">
+            <a:extLst>
+              <a:ext uri="{FF2B5EF4-FFF2-40B4-BE49-F238E27FC236}">
+                <a16:creationId xmlns:a16="http://schemas.microsoft.com/office/drawing/2014/main" id="{A29679B9-963A-40CC-B5DA-4BE1476E762C}"/>
               </a:ext>
             </a:extLst>
           </p:cNvPr>
@@ -7268,66 +7676,19 @@
           <p:nvPr/>
         </p:nvPicPr>
         <p:blipFill>
-          <a:blip r:embed="rId2"/>
+          <a:blip r:embed="rId3"/>
           <a:stretch>
             <a:fillRect/>
           </a:stretch>
         </p:blipFill>
         <p:spPr>
           <a:xfrm>
-            <a:off x="2808730" y="1281663"/>
-            <a:ext cx="4333875" cy="485775"/>
+            <a:off x="1793812" y="2016700"/>
+            <a:ext cx="5511622" cy="3471769"/>
           </a:xfrm>
           <a:prstGeom prst="rect">
             <a:avLst/>
           </a:prstGeom>
-        </p:spPr>
-      </p:pic>
-      <p:pic>
-        <p:nvPicPr>
-          <p:cNvPr id="2052" name="Picture 4">
-            <a:extLst>
-              <a:ext uri="{FF2B5EF4-FFF2-40B4-BE49-F238E27FC236}">
-                <a16:creationId xmlns:a16="http://schemas.microsoft.com/office/drawing/2014/main" id="{CBD5C4B6-A397-416F-9B8C-C5A6CD43A10E}"/>
-              </a:ext>
-            </a:extLst>
-          </p:cNvPr>
-          <p:cNvPicPr>
-            <a:picLocks noChangeAspect="1" noChangeArrowheads="1"/>
-          </p:cNvPicPr>
-          <p:nvPr/>
-        </p:nvPicPr>
-        <p:blipFill>
-          <a:blip r:embed="rId3">
-            <a:extLst>
-              <a:ext uri="{28A0092B-C50C-407E-A947-70E740481C1C}">
-                <a14:useLocalDpi xmlns:a14="http://schemas.microsoft.com/office/drawing/2010/main" val="0"/>
-              </a:ext>
-            </a:extLst>
-          </a:blip>
-          <a:srcRect/>
-          <a:stretch>
-            <a:fillRect/>
-          </a:stretch>
-        </p:blipFill>
-        <p:spPr bwMode="auto">
-          <a:xfrm>
-            <a:off x="1875693" y="2160589"/>
-            <a:ext cx="5844372" cy="3719146"/>
-          </a:xfrm>
-          <a:prstGeom prst="rect">
-            <a:avLst/>
-          </a:prstGeom>
-          <a:noFill/>
-          <a:extLst>
-            <a:ext uri="{909E8E84-426E-40DD-AFC4-6F175D3DCCD1}">
-              <a14:hiddenFill xmlns:a14="http://schemas.microsoft.com/office/drawing/2010/main">
-                <a:solidFill>
-                  <a:srgbClr val="FFFFFF"/>
-                </a:solidFill>
-              </a14:hiddenFill>
-            </a:ext>
-          </a:extLst>
         </p:spPr>
       </p:pic>
     </p:spTree>
@@ -7606,13 +7967,13 @@
           <a:p>
             <a:r>
               <a:rPr lang="en-US" sz="2000" dirty="0"/>
-              <a:t>Two data sets were provided with questions that needed answered.</a:t>
+              <a:t>Two data sets were provided with questions that needed answers.</a:t>
             </a:r>
           </a:p>
           <a:p>
             <a:r>
               <a:rPr lang="en-US" sz="2000" dirty="0"/>
-              <a:t>One contained beers and variables, the other breweries and variables.</a:t>
+              <a:t>One dataset contained information regarding beer, the other contained information regarding breweries.</a:t>
             </a:r>
           </a:p>
           <a:p>
@@ -7710,7 +8071,9 @@
         </p:nvSpPr>
         <p:spPr/>
         <p:txBody>
-          <a:bodyPr/>
+          <a:bodyPr>
+            <a:normAutofit fontScale="92500" lnSpcReduction="20000"/>
+          </a:bodyPr>
           <a:lstStyle/>
           <a:p>
             <a:r>
@@ -7747,10 +8110,10 @@
             <a:r>
               <a:rPr lang="en-US" dirty="0">
                 <a:solidFill>
-                  <a:srgbClr val="FF0000"/>
+                  <a:schemeClr val="tx1"/>
                 </a:solidFill>
               </a:rPr>
-              <a:t>&lt;INSERT GITHUB&gt;</a:t>
+              <a:t>https://github.com/vazquezs123/DATA_SCIENCE_CS01</a:t>
             </a:r>
           </a:p>
           <a:p>
@@ -7779,8 +8142,31 @@
             <a:pPr lvl="1"/>
             <a:r>
               <a:rPr lang="en-US" dirty="0"/>
-              <a:t>ggplot2</a:t>
-            </a:r>
+              <a:t>Ggplot2</a:t>
+            </a:r>
+          </a:p>
+          <a:p>
+            <a:pPr lvl="1"/>
+            <a:r>
+              <a:rPr lang="en-US" dirty="0" err="1"/>
+              <a:t>Data.table</a:t>
+            </a:r>
+            <a:endParaRPr lang="en-US" dirty="0"/>
+          </a:p>
+          <a:p>
+            <a:pPr lvl="1"/>
+            <a:r>
+              <a:rPr lang="en-US" dirty="0"/>
+              <a:t>Reshape2</a:t>
+            </a:r>
+          </a:p>
+          <a:p>
+            <a:pPr lvl="1"/>
+            <a:r>
+              <a:rPr lang="en-US" dirty="0" err="1"/>
+              <a:t>doBy</a:t>
+            </a:r>
+            <a:endParaRPr lang="en-US" dirty="0"/>
           </a:p>
           <a:p>
             <a:pPr lvl="1"/>
@@ -8193,31 +8579,6 @@
           </a:p>
         </p:txBody>
       </p:sp>
-      <p:sp>
-        <p:nvSpPr>
-          <p:cNvPr id="3" name="Content Placeholder 2">
-            <a:extLst>
-              <a:ext uri="{FF2B5EF4-FFF2-40B4-BE49-F238E27FC236}">
-                <a16:creationId xmlns:a16="http://schemas.microsoft.com/office/drawing/2014/main" id="{65FBBA02-59F3-4E3D-A9EF-6EB0F52449D4}"/>
-              </a:ext>
-            </a:extLst>
-          </p:cNvPr>
-          <p:cNvSpPr>
-            <a:spLocks noGrp="1"/>
-          </p:cNvSpPr>
-          <p:nvPr>
-            <p:ph idx="1"/>
-          </p:nvPr>
-        </p:nvSpPr>
-        <p:spPr/>
-        <p:txBody>
-          <a:bodyPr/>
-          <a:lstStyle/>
-          <a:p>
-            <a:endParaRPr lang="en-US" dirty="0"/>
-          </a:p>
-        </p:txBody>
-      </p:sp>
       <p:pic>
         <p:nvPicPr>
           <p:cNvPr id="4" name="Picture 3">
@@ -8240,8 +8601,8 @@
         </p:blipFill>
         <p:spPr>
           <a:xfrm>
-            <a:off x="3389755" y="3141578"/>
-            <a:ext cx="3171825" cy="962025"/>
+            <a:off x="677334" y="1703295"/>
+            <a:ext cx="7596119" cy="2303928"/>
           </a:xfrm>
           <a:prstGeom prst="rect">
             <a:avLst/>
@@ -8328,14 +8689,49 @@
         </p:blipFill>
         <p:spPr>
           <a:xfrm>
-            <a:off x="2027680" y="2395537"/>
-            <a:ext cx="5895975" cy="2066925"/>
+            <a:off x="1178207" y="2097741"/>
+            <a:ext cx="7804428" cy="2735962"/>
           </a:xfrm>
           <a:prstGeom prst="rect">
             <a:avLst/>
           </a:prstGeom>
         </p:spPr>
       </p:pic>
+      <p:sp>
+        <p:nvSpPr>
+          <p:cNvPr id="3" name="TextBox 2">
+            <a:extLst>
+              <a:ext uri="{FF2B5EF4-FFF2-40B4-BE49-F238E27FC236}">
+                <a16:creationId xmlns:a16="http://schemas.microsoft.com/office/drawing/2014/main" id="{48B11376-B7EE-45AF-9DC2-0220BC5946D1}"/>
+              </a:ext>
+            </a:extLst>
+          </p:cNvPr>
+          <p:cNvSpPr txBox="1"/>
+          <p:nvPr/>
+        </p:nvSpPr>
+        <p:spPr>
+          <a:xfrm>
+            <a:off x="744327" y="5396753"/>
+            <a:ext cx="8462682" cy="369332"/>
+          </a:xfrm>
+          <a:prstGeom prst="rect">
+            <a:avLst/>
+          </a:prstGeom>
+          <a:noFill/>
+        </p:spPr>
+        <p:txBody>
+          <a:bodyPr wrap="square" rtlCol="0">
+            <a:spAutoFit/>
+          </a:bodyPr>
+          <a:lstStyle/>
+          <a:p>
+            <a:r>
+              <a:rPr lang="en-US" dirty="0"/>
+              <a:t>* Colorado in lead with most breweries, while all states have at least 1 brewery.</a:t>
+            </a:r>
+          </a:p>
+        </p:txBody>
+      </p:sp>
     </p:spTree>
     <p:extLst>
       <p:ext uri="{BB962C8B-B14F-4D97-AF65-F5344CB8AC3E}">
@@ -8417,14 +8813,14 @@
           <a:p>
             <a:r>
               <a:rPr lang="en-US" dirty="0"/>
-              <a:t>One minor change had to be made, the column names had to be changed.</a:t>
+              <a:t>One minor variable name change had to be made to avoid a merge conflict.</a:t>
             </a:r>
           </a:p>
           <a:p>
             <a:pPr lvl="1"/>
             <a:r>
               <a:rPr lang="en-US" dirty="0"/>
-              <a:t>“name” was a duplicate variable.</a:t>
+              <a:t>“name” was a duplicate variable found in both datasets.</a:t>
             </a:r>
           </a:p>
           <a:p>
@@ -8463,7 +8859,7 @@
           <p:nvPr/>
         </p:nvPicPr>
         <p:blipFill>
-          <a:blip r:embed="rId2"/>
+          <a:blip r:embed="rId3"/>
           <a:stretch>
             <a:fillRect/>
           </a:stretch>

</xml_diff>

<commit_message>
Added introduction and conclusion. Added linear regression model to .Rmd and PPT. Various other touchups.
</commit_message>
<xml_diff>
--- a/Breweries and Beer Study.pptx
+++ b/Breweries and Beer Study.pptx
@@ -5,7 +5,7 @@
     <p:sldMasterId id="2147483696" r:id="rId1"/>
   </p:sldMasterIdLst>
   <p:notesMasterIdLst>
-    <p:notesMasterId r:id="rId19"/>
+    <p:notesMasterId r:id="rId22"/>
   </p:notesMasterIdLst>
   <p:sldIdLst>
     <p:sldId id="256" r:id="rId2"/>
@@ -22,9 +22,12 @@
     <p:sldId id="267" r:id="rId13"/>
     <p:sldId id="273" r:id="rId14"/>
     <p:sldId id="269" r:id="rId15"/>
-    <p:sldId id="270" r:id="rId16"/>
-    <p:sldId id="271" r:id="rId17"/>
-    <p:sldId id="272" r:id="rId18"/>
+    <p:sldId id="276" r:id="rId16"/>
+    <p:sldId id="270" r:id="rId17"/>
+    <p:sldId id="271" r:id="rId18"/>
+    <p:sldId id="275" r:id="rId19"/>
+    <p:sldId id="274" r:id="rId20"/>
+    <p:sldId id="272" r:id="rId21"/>
   </p:sldIdLst>
   <p:sldSz cx="12192000" cy="6858000"/>
   <p:notesSz cx="6858000" cy="9144000"/>
@@ -213,7 +216,7 @@
           <a:p>
             <a:fld id="{0257D765-DFDE-4CE3-ABA3-B121D8D16204}" type="datetimeFigureOut">
               <a:rPr lang="en-US" smtClean="0"/>
-              <a:t>2/24/2019</a:t>
+              <a:t>2/25/2019</a:t>
             </a:fld>
             <a:endParaRPr lang="en-US"/>
           </a:p>
@@ -807,6 +810,90 @@
     <p:extLst>
       <p:ext uri="{BB962C8B-B14F-4D97-AF65-F5344CB8AC3E}">
         <p14:creationId xmlns:p14="http://schemas.microsoft.com/office/powerpoint/2010/main" val="3158548462"/>
+      </p:ext>
+    </p:extLst>
+  </p:cSld>
+  <p:clrMapOvr>
+    <a:masterClrMapping/>
+  </p:clrMapOvr>
+</p:notes>
+</file>
+
+<file path=ppt/notesSlides/notesSlide5.xml><?xml version="1.0" encoding="utf-8"?>
+<p:notes xmlns:a="http://schemas.openxmlformats.org/drawingml/2006/main" xmlns:r="http://schemas.openxmlformats.org/officeDocument/2006/relationships" xmlns:p="http://schemas.openxmlformats.org/presentationml/2006/main">
+  <p:cSld>
+    <p:spTree>
+      <p:nvGrpSpPr>
+        <p:cNvPr id="1" name=""/>
+        <p:cNvGrpSpPr/>
+        <p:nvPr/>
+      </p:nvGrpSpPr>
+      <p:grpSpPr>
+        <a:xfrm>
+          <a:off x="0" y="0"/>
+          <a:ext cx="0" cy="0"/>
+          <a:chOff x="0" y="0"/>
+          <a:chExt cx="0" cy="0"/>
+        </a:xfrm>
+      </p:grpSpPr>
+      <p:sp>
+        <p:nvSpPr>
+          <p:cNvPr id="2" name="Slide Image Placeholder 1"/>
+          <p:cNvSpPr>
+            <a:spLocks noGrp="1" noRot="1" noChangeAspect="1"/>
+          </p:cNvSpPr>
+          <p:nvPr>
+            <p:ph type="sldImg"/>
+          </p:nvPr>
+        </p:nvSpPr>
+        <p:spPr/>
+      </p:sp>
+      <p:sp>
+        <p:nvSpPr>
+          <p:cNvPr id="3" name="Notes Placeholder 2"/>
+          <p:cNvSpPr>
+            <a:spLocks noGrp="1"/>
+          </p:cNvSpPr>
+          <p:nvPr>
+            <p:ph type="body" idx="1"/>
+          </p:nvPr>
+        </p:nvSpPr>
+        <p:spPr/>
+        <p:txBody>
+          <a:bodyPr/>
+          <a:lstStyle/>
+          <a:p>
+            <a:endParaRPr lang="en-US" dirty="0"/>
+          </a:p>
+        </p:txBody>
+      </p:sp>
+      <p:sp>
+        <p:nvSpPr>
+          <p:cNvPr id="4" name="Slide Number Placeholder 3"/>
+          <p:cNvSpPr>
+            <a:spLocks noGrp="1"/>
+          </p:cNvSpPr>
+          <p:nvPr>
+            <p:ph type="sldNum" sz="quarter" idx="5"/>
+          </p:nvPr>
+        </p:nvSpPr>
+        <p:spPr/>
+        <p:txBody>
+          <a:bodyPr/>
+          <a:lstStyle/>
+          <a:p>
+            <a:fld id="{CC40ABAD-A3F6-46BE-8C15-16F397FA38B2}" type="slidenum">
+              <a:rPr lang="en-US" smtClean="0"/>
+              <a:t>16</a:t>
+            </a:fld>
+            <a:endParaRPr lang="en-US"/>
+          </a:p>
+        </p:txBody>
+      </p:sp>
+    </p:spTree>
+    <p:extLst>
+      <p:ext uri="{BB962C8B-B14F-4D97-AF65-F5344CB8AC3E}">
+        <p14:creationId xmlns:p14="http://schemas.microsoft.com/office/powerpoint/2010/main" val="859622353"/>
       </p:ext>
     </p:extLst>
   </p:cSld>
@@ -1538,7 +1625,7 @@
           <a:p>
             <a:fld id="{99EF30BF-B2AF-40A2-882C-4069CB9E54A2}" type="datetimeFigureOut">
               <a:rPr lang="en-US" smtClean="0"/>
-              <a:t>2/24/2019</a:t>
+              <a:t>2/25/2019</a:t>
             </a:fld>
             <a:endParaRPr lang="en-US"/>
           </a:p>
@@ -1789,7 +1876,7 @@
           <a:p>
             <a:fld id="{99EF30BF-B2AF-40A2-882C-4069CB9E54A2}" type="datetimeFigureOut">
               <a:rPr lang="en-US" smtClean="0"/>
-              <a:t>2/24/2019</a:t>
+              <a:t>2/25/2019</a:t>
             </a:fld>
             <a:endParaRPr lang="en-US"/>
           </a:p>
@@ -2103,7 +2190,7 @@
           <a:p>
             <a:fld id="{99EF30BF-B2AF-40A2-882C-4069CB9E54A2}" type="datetimeFigureOut">
               <a:rPr lang="en-US" smtClean="0"/>
-              <a:t>2/24/2019</a:t>
+              <a:t>2/25/2019</a:t>
             </a:fld>
             <a:endParaRPr lang="en-US"/>
           </a:p>
@@ -2444,7 +2531,7 @@
           <a:p>
             <a:fld id="{99EF30BF-B2AF-40A2-882C-4069CB9E54A2}" type="datetimeFigureOut">
               <a:rPr lang="en-US" smtClean="0"/>
-              <a:t>2/24/2019</a:t>
+              <a:t>2/25/2019</a:t>
             </a:fld>
             <a:endParaRPr lang="en-US"/>
           </a:p>
@@ -2758,7 +2845,7 @@
           <a:p>
             <a:fld id="{99EF30BF-B2AF-40A2-882C-4069CB9E54A2}" type="datetimeFigureOut">
               <a:rPr lang="en-US" smtClean="0"/>
-              <a:t>2/24/2019</a:t>
+              <a:t>2/25/2019</a:t>
             </a:fld>
             <a:endParaRPr lang="en-US"/>
           </a:p>
@@ -3151,7 +3238,7 @@
           <a:p>
             <a:fld id="{99EF30BF-B2AF-40A2-882C-4069CB9E54A2}" type="datetimeFigureOut">
               <a:rPr lang="en-US" smtClean="0"/>
-              <a:t>2/24/2019</a:t>
+              <a:t>2/25/2019</a:t>
             </a:fld>
             <a:endParaRPr lang="en-US"/>
           </a:p>
@@ -3321,7 +3408,7 @@
           <a:p>
             <a:fld id="{99EF30BF-B2AF-40A2-882C-4069CB9E54A2}" type="datetimeFigureOut">
               <a:rPr lang="en-US" smtClean="0"/>
-              <a:t>2/24/2019</a:t>
+              <a:t>2/25/2019</a:t>
             </a:fld>
             <a:endParaRPr lang="en-US"/>
           </a:p>
@@ -3501,7 +3588,7 @@
           <a:p>
             <a:fld id="{99EF30BF-B2AF-40A2-882C-4069CB9E54A2}" type="datetimeFigureOut">
               <a:rPr lang="en-US" smtClean="0"/>
-              <a:t>2/24/2019</a:t>
+              <a:t>2/25/2019</a:t>
             </a:fld>
             <a:endParaRPr lang="en-US"/>
           </a:p>
@@ -3677,7 +3764,7 @@
           <a:p>
             <a:fld id="{99EF30BF-B2AF-40A2-882C-4069CB9E54A2}" type="datetimeFigureOut">
               <a:rPr lang="en-US" smtClean="0"/>
-              <a:t>2/24/2019</a:t>
+              <a:t>2/25/2019</a:t>
             </a:fld>
             <a:endParaRPr lang="en-US"/>
           </a:p>
@@ -3924,7 +4011,7 @@
           <a:p>
             <a:fld id="{99EF30BF-B2AF-40A2-882C-4069CB9E54A2}" type="datetimeFigureOut">
               <a:rPr lang="en-US" smtClean="0"/>
-              <a:t>2/24/2019</a:t>
+              <a:t>2/25/2019</a:t>
             </a:fld>
             <a:endParaRPr lang="en-US"/>
           </a:p>
@@ -4156,7 +4243,7 @@
           <a:p>
             <a:fld id="{99EF30BF-B2AF-40A2-882C-4069CB9E54A2}" type="datetimeFigureOut">
               <a:rPr lang="en-US" smtClean="0"/>
-              <a:t>2/24/2019</a:t>
+              <a:t>2/25/2019</a:t>
             </a:fld>
             <a:endParaRPr lang="en-US"/>
           </a:p>
@@ -4530,7 +4617,7 @@
           <a:p>
             <a:fld id="{99EF30BF-B2AF-40A2-882C-4069CB9E54A2}" type="datetimeFigureOut">
               <a:rPr lang="en-US" smtClean="0"/>
-              <a:t>2/24/2019</a:t>
+              <a:t>2/25/2019</a:t>
             </a:fld>
             <a:endParaRPr lang="en-US"/>
           </a:p>
@@ -4653,7 +4740,7 @@
           <a:p>
             <a:fld id="{99EF30BF-B2AF-40A2-882C-4069CB9E54A2}" type="datetimeFigureOut">
               <a:rPr lang="en-US" smtClean="0"/>
-              <a:t>2/24/2019</a:t>
+              <a:t>2/25/2019</a:t>
             </a:fld>
             <a:endParaRPr lang="en-US"/>
           </a:p>
@@ -4748,7 +4835,7 @@
           <a:p>
             <a:fld id="{99EF30BF-B2AF-40A2-882C-4069CB9E54A2}" type="datetimeFigureOut">
               <a:rPr lang="en-US" smtClean="0"/>
-              <a:t>2/24/2019</a:t>
+              <a:t>2/25/2019</a:t>
             </a:fld>
             <a:endParaRPr lang="en-US"/>
           </a:p>
@@ -5003,7 +5090,7 @@
           <a:p>
             <a:fld id="{99EF30BF-B2AF-40A2-882C-4069CB9E54A2}" type="datetimeFigureOut">
               <a:rPr lang="en-US" smtClean="0"/>
-              <a:t>2/24/2019</a:t>
+              <a:t>2/25/2019</a:t>
             </a:fld>
             <a:endParaRPr lang="en-US"/>
           </a:p>
@@ -5266,7 +5353,7 @@
           <a:p>
             <a:fld id="{99EF30BF-B2AF-40A2-882C-4069CB9E54A2}" type="datetimeFigureOut">
               <a:rPr lang="en-US" smtClean="0"/>
-              <a:t>2/24/2019</a:t>
+              <a:t>2/25/2019</a:t>
             </a:fld>
             <a:endParaRPr lang="en-US"/>
           </a:p>
@@ -6009,7 +6096,7 @@
           <a:p>
             <a:fld id="{99EF30BF-B2AF-40A2-882C-4069CB9E54A2}" type="datetimeFigureOut">
               <a:rPr lang="en-US" smtClean="0"/>
-              <a:t>2/24/2019</a:t>
+              <a:t>2/25/2019</a:t>
             </a:fld>
             <a:endParaRPr lang="en-US"/>
           </a:p>
@@ -7221,10 +7308,10 @@
       </p:sp>
       <p:pic>
         <p:nvPicPr>
-          <p:cNvPr id="4" name="Picture 3">
+          <p:cNvPr id="3" name="Picture 2">
             <a:extLst>
               <a:ext uri="{FF2B5EF4-FFF2-40B4-BE49-F238E27FC236}">
-                <a16:creationId xmlns:a16="http://schemas.microsoft.com/office/drawing/2014/main" id="{A964F3BE-A16B-4C0E-BC01-75F76702FB44}"/>
+                <a16:creationId xmlns:a16="http://schemas.microsoft.com/office/drawing/2014/main" id="{5D34D7FF-BDEA-4139-B71D-95CDB39A2330}"/>
               </a:ext>
             </a:extLst>
           </p:cNvPr>
@@ -7241,8 +7328,8 @@
         </p:blipFill>
         <p:spPr>
           <a:xfrm>
-            <a:off x="560830" y="2392241"/>
-            <a:ext cx="8829675" cy="3181350"/>
+            <a:off x="677334" y="1930400"/>
+            <a:ext cx="8674679" cy="3594912"/>
           </a:xfrm>
           <a:prstGeom prst="rect">
             <a:avLst/>
@@ -7284,7 +7371,7 @@
           <p:cNvPr id="2" name="Title 1">
             <a:extLst>
               <a:ext uri="{FF2B5EF4-FFF2-40B4-BE49-F238E27FC236}">
-                <a16:creationId xmlns:a16="http://schemas.microsoft.com/office/drawing/2014/main" id="{3DD4D517-6115-4792-A0BE-F74004904FA2}"/>
+                <a16:creationId xmlns:a16="http://schemas.microsoft.com/office/drawing/2014/main" id="{4F319396-7644-4C89-B700-814319DB2620}"/>
               </a:ext>
             </a:extLst>
           </p:cNvPr>
@@ -7302,62 +7389,8 @@
           <a:p>
             <a:r>
               <a:rPr lang="en-US" dirty="0"/>
-              <a:t>Question 6: What does ABV look like?</a:t>
-            </a:r>
-          </a:p>
-        </p:txBody>
-      </p:sp>
-      <p:sp>
-        <p:nvSpPr>
-          <p:cNvPr id="3" name="Content Placeholder 2">
-            <a:extLst>
-              <a:ext uri="{FF2B5EF4-FFF2-40B4-BE49-F238E27FC236}">
-                <a16:creationId xmlns:a16="http://schemas.microsoft.com/office/drawing/2014/main" id="{AA103BB0-5765-4043-930A-0BAD0C85239A}"/>
-              </a:ext>
-            </a:extLst>
-          </p:cNvPr>
-          <p:cNvSpPr>
-            <a:spLocks noGrp="1"/>
-          </p:cNvSpPr>
-          <p:nvPr>
-            <p:ph idx="1"/>
-          </p:nvPr>
-        </p:nvSpPr>
-        <p:spPr>
-          <a:xfrm>
-            <a:off x="677334" y="1607696"/>
-            <a:ext cx="8596668" cy="3880773"/>
-          </a:xfrm>
-        </p:spPr>
-        <p:txBody>
-          <a:bodyPr/>
-          <a:lstStyle/>
-          <a:p>
-            <a:r>
-              <a:rPr lang="en-US" dirty="0"/>
-              <a:t>Summary of ABV</a:t>
-            </a:r>
-          </a:p>
-          <a:p>
-            <a:endParaRPr lang="en-US" dirty="0"/>
-          </a:p>
-          <a:p>
-            <a:endParaRPr lang="en-US" dirty="0"/>
-          </a:p>
-          <a:p>
-            <a:endParaRPr lang="en-US" dirty="0"/>
-          </a:p>
-          <a:p>
-            <a:endParaRPr lang="en-US" dirty="0"/>
-          </a:p>
-          <a:p>
-            <a:pPr marL="0" indent="0">
-              <a:buNone/>
-            </a:pPr>
-            <a:endParaRPr lang="en-US" dirty="0"/>
-          </a:p>
-          <a:p>
-            <a:endParaRPr lang="en-US" dirty="0"/>
+              <a:t>Question 5: Which state has the highest IBU?</a:t>
+            </a:r>
           </a:p>
         </p:txBody>
       </p:sp>
@@ -7366,36 +7399,7 @@
           <p:cNvPr id="5" name="Picture 4">
             <a:extLst>
               <a:ext uri="{FF2B5EF4-FFF2-40B4-BE49-F238E27FC236}">
-                <a16:creationId xmlns:a16="http://schemas.microsoft.com/office/drawing/2014/main" id="{47417CA5-A657-4DED-8FD0-9917DE4C1475}"/>
-              </a:ext>
-            </a:extLst>
-          </p:cNvPr>
-          <p:cNvPicPr>
-            <a:picLocks noChangeAspect="1"/>
-          </p:cNvPicPr>
-          <p:nvPr/>
-        </p:nvPicPr>
-        <p:blipFill rotWithShape="1">
-          <a:blip r:embed="rId2"/>
-          <a:srcRect t="50000"/>
-          <a:stretch/>
-        </p:blipFill>
-        <p:spPr>
-          <a:xfrm>
-            <a:off x="1587348" y="5472113"/>
-            <a:ext cx="5924550" cy="776287"/>
-          </a:xfrm>
-          <a:prstGeom prst="rect">
-            <a:avLst/>
-          </a:prstGeom>
-        </p:spPr>
-      </p:pic>
-      <p:pic>
-        <p:nvPicPr>
-          <p:cNvPr id="7" name="Picture 6">
-            <a:extLst>
-              <a:ext uri="{FF2B5EF4-FFF2-40B4-BE49-F238E27FC236}">
-                <a16:creationId xmlns:a16="http://schemas.microsoft.com/office/drawing/2014/main" id="{A29679B9-963A-40CC-B5DA-4BE1476E762C}"/>
+                <a16:creationId xmlns:a16="http://schemas.microsoft.com/office/drawing/2014/main" id="{376EF9F8-E3BA-4274-8E6F-5DDF9427E3FE}"/>
               </a:ext>
             </a:extLst>
           </p:cNvPr>
@@ -7405,15 +7409,15 @@
           <p:nvPr/>
         </p:nvPicPr>
         <p:blipFill>
-          <a:blip r:embed="rId3"/>
+          <a:blip r:embed="rId2"/>
           <a:stretch>
             <a:fillRect/>
           </a:stretch>
         </p:blipFill>
         <p:spPr>
           <a:xfrm>
-            <a:off x="1793812" y="2016700"/>
-            <a:ext cx="5511622" cy="3471769"/>
+            <a:off x="677334" y="1930400"/>
+            <a:ext cx="8714794" cy="3565728"/>
           </a:xfrm>
           <a:prstGeom prst="rect">
             <a:avLst/>
@@ -7423,7 +7427,7 @@
     </p:spTree>
     <p:extLst>
       <p:ext uri="{BB962C8B-B14F-4D97-AF65-F5344CB8AC3E}">
-        <p14:creationId xmlns:p14="http://schemas.microsoft.com/office/powerpoint/2010/main" val="1890548231"/>
+        <p14:creationId xmlns:p14="http://schemas.microsoft.com/office/powerpoint/2010/main" val="2648840759"/>
       </p:ext>
     </p:extLst>
   </p:cSld>
@@ -7455,7 +7459,7 @@
           <p:cNvPr id="2" name="Title 1">
             <a:extLst>
               <a:ext uri="{FF2B5EF4-FFF2-40B4-BE49-F238E27FC236}">
-                <a16:creationId xmlns:a16="http://schemas.microsoft.com/office/drawing/2014/main" id="{673C857C-FC3F-4961-94F9-3862F6BFE055}"/>
+                <a16:creationId xmlns:a16="http://schemas.microsoft.com/office/drawing/2014/main" id="{3DD4D517-6115-4792-A0BE-F74004904FA2}"/>
               </a:ext>
             </a:extLst>
           </p:cNvPr>
@@ -7466,10 +7470,38 @@
             <p:ph type="title"/>
           </p:nvPr>
         </p:nvSpPr>
+        <p:spPr/>
+        <p:txBody>
+          <a:bodyPr/>
+          <a:lstStyle/>
+          <a:p>
+            <a:r>
+              <a:rPr lang="en-US" dirty="0"/>
+              <a:t>Question 6: What does ABV look like?</a:t>
+            </a:r>
+          </a:p>
+        </p:txBody>
+      </p:sp>
+      <p:sp>
+        <p:nvSpPr>
+          <p:cNvPr id="3" name="Content Placeholder 2">
+            <a:extLst>
+              <a:ext uri="{FF2B5EF4-FFF2-40B4-BE49-F238E27FC236}">
+                <a16:creationId xmlns:a16="http://schemas.microsoft.com/office/drawing/2014/main" id="{AA103BB0-5765-4043-930A-0BAD0C85239A}"/>
+              </a:ext>
+            </a:extLst>
+          </p:cNvPr>
+          <p:cNvSpPr>
+            <a:spLocks noGrp="1"/>
+          </p:cNvSpPr>
+          <p:nvPr>
+            <p:ph idx="1"/>
+          </p:nvPr>
+        </p:nvSpPr>
         <p:spPr>
           <a:xfrm>
-            <a:off x="677334" y="609600"/>
-            <a:ext cx="8596668" cy="1320800"/>
+            <a:off x="677334" y="1607696"/>
+            <a:ext cx="8596668" cy="3880773"/>
           </a:xfrm>
         </p:spPr>
         <p:txBody>
@@ -7478,62 +7510,95 @@
           <a:p>
             <a:r>
               <a:rPr lang="en-US" dirty="0"/>
-              <a:t>Question 7: Is there a relationship between IBU and ABV?</a:t>
-            </a:r>
+              <a:t>Summary of ABV</a:t>
+            </a:r>
+          </a:p>
+          <a:p>
+            <a:endParaRPr lang="en-US" dirty="0"/>
+          </a:p>
+          <a:p>
+            <a:endParaRPr lang="en-US" dirty="0"/>
+          </a:p>
+          <a:p>
+            <a:endParaRPr lang="en-US" dirty="0"/>
+          </a:p>
+          <a:p>
+            <a:endParaRPr lang="en-US" dirty="0"/>
+          </a:p>
+          <a:p>
+            <a:pPr marL="0" indent="0">
+              <a:buNone/>
+            </a:pPr>
+            <a:endParaRPr lang="en-US" dirty="0"/>
+          </a:p>
+          <a:p>
+            <a:endParaRPr lang="en-US" dirty="0"/>
           </a:p>
         </p:txBody>
       </p:sp>
       <p:pic>
         <p:nvPicPr>
-          <p:cNvPr id="3076" name="Picture 4">
+          <p:cNvPr id="5" name="Picture 4">
             <a:extLst>
               <a:ext uri="{FF2B5EF4-FFF2-40B4-BE49-F238E27FC236}">
-                <a16:creationId xmlns:a16="http://schemas.microsoft.com/office/drawing/2014/main" id="{140CDC69-BDBB-4B29-A16B-B57A3E6B0150}"/>
+                <a16:creationId xmlns:a16="http://schemas.microsoft.com/office/drawing/2014/main" id="{47417CA5-A657-4DED-8FD0-9917DE4C1475}"/>
               </a:ext>
             </a:extLst>
           </p:cNvPr>
           <p:cNvPicPr>
-            <a:picLocks noChangeAspect="1" noChangeArrowheads="1"/>
+            <a:picLocks noChangeAspect="1"/>
+          </p:cNvPicPr>
+          <p:nvPr/>
+        </p:nvPicPr>
+        <p:blipFill rotWithShape="1">
+          <a:blip r:embed="rId3"/>
+          <a:srcRect t="50000"/>
+          <a:stretch/>
+        </p:blipFill>
+        <p:spPr>
+          <a:xfrm>
+            <a:off x="1587348" y="5472113"/>
+            <a:ext cx="5924550" cy="776287"/>
+          </a:xfrm>
+          <a:prstGeom prst="rect">
+            <a:avLst/>
+          </a:prstGeom>
+        </p:spPr>
+      </p:pic>
+      <p:pic>
+        <p:nvPicPr>
+          <p:cNvPr id="6" name="Picture 5">
+            <a:extLst>
+              <a:ext uri="{FF2B5EF4-FFF2-40B4-BE49-F238E27FC236}">
+                <a16:creationId xmlns:a16="http://schemas.microsoft.com/office/drawing/2014/main" id="{4C69C0FE-240B-441F-B91F-44408B935827}"/>
+              </a:ext>
+            </a:extLst>
+          </p:cNvPr>
+          <p:cNvPicPr>
+            <a:picLocks noChangeAspect="1"/>
           </p:cNvPicPr>
           <p:nvPr/>
         </p:nvPicPr>
         <p:blipFill>
-          <a:blip r:embed="rId2">
-            <a:extLst>
-              <a:ext uri="{28A0092B-C50C-407E-A947-70E740481C1C}">
-                <a14:useLocalDpi xmlns:a14="http://schemas.microsoft.com/office/drawing/2010/main" val="0"/>
-              </a:ext>
-            </a:extLst>
-          </a:blip>
-          <a:srcRect/>
+          <a:blip r:embed="rId4"/>
           <a:stretch>
             <a:fillRect/>
           </a:stretch>
         </p:blipFill>
-        <p:spPr bwMode="auto">
+        <p:spPr>
           <a:xfrm>
-            <a:off x="565638" y="1811482"/>
-            <a:ext cx="7488115" cy="4765164"/>
+            <a:off x="1776427" y="1958946"/>
+            <a:ext cx="5546392" cy="3529523"/>
           </a:xfrm>
           <a:prstGeom prst="rect">
             <a:avLst/>
           </a:prstGeom>
-          <a:noFill/>
-          <a:extLst>
-            <a:ext uri="{909E8E84-426E-40DD-AFC4-6F175D3DCCD1}">
-              <a14:hiddenFill xmlns:a14="http://schemas.microsoft.com/office/drawing/2010/main">
-                <a:solidFill>
-                  <a:srgbClr val="FFFFFF"/>
-                </a:solidFill>
-              </a14:hiddenFill>
-            </a:ext>
-          </a:extLst>
         </p:spPr>
       </p:pic>
     </p:spTree>
     <p:extLst>
       <p:ext uri="{BB962C8B-B14F-4D97-AF65-F5344CB8AC3E}">
-        <p14:creationId xmlns:p14="http://schemas.microsoft.com/office/powerpoint/2010/main" val="1673050933"/>
+        <p14:creationId xmlns:p14="http://schemas.microsoft.com/office/powerpoint/2010/main" val="1890548231"/>
       </p:ext>
     </p:extLst>
   </p:cSld>
@@ -7565,7 +7630,7 @@
           <p:cNvPr id="2" name="Title 1">
             <a:extLst>
               <a:ext uri="{FF2B5EF4-FFF2-40B4-BE49-F238E27FC236}">
-                <a16:creationId xmlns:a16="http://schemas.microsoft.com/office/drawing/2014/main" id="{38642D8D-4F65-4538-83C8-B07809A4E6DB}"/>
+                <a16:creationId xmlns:a16="http://schemas.microsoft.com/office/drawing/2014/main" id="{673C857C-FC3F-4961-94F9-3862F6BFE055}"/>
               </a:ext>
             </a:extLst>
           </p:cNvPr>
@@ -7576,6 +7641,99 @@
             <p:ph type="title"/>
           </p:nvPr>
         </p:nvSpPr>
+        <p:spPr>
+          <a:xfrm>
+            <a:off x="677334" y="609600"/>
+            <a:ext cx="8596668" cy="1320800"/>
+          </a:xfrm>
+        </p:spPr>
+        <p:txBody>
+          <a:bodyPr/>
+          <a:lstStyle/>
+          <a:p>
+            <a:r>
+              <a:rPr lang="en-US" dirty="0"/>
+              <a:t>Question 7: Is there a relationship between IBU and ABV?</a:t>
+            </a:r>
+          </a:p>
+        </p:txBody>
+      </p:sp>
+      <p:pic>
+        <p:nvPicPr>
+          <p:cNvPr id="3" name="Picture 2">
+            <a:extLst>
+              <a:ext uri="{FF2B5EF4-FFF2-40B4-BE49-F238E27FC236}">
+                <a16:creationId xmlns:a16="http://schemas.microsoft.com/office/drawing/2014/main" id="{0272154B-D300-41D1-9099-259C8075ED66}"/>
+              </a:ext>
+            </a:extLst>
+          </p:cNvPr>
+          <p:cNvPicPr>
+            <a:picLocks noChangeAspect="1"/>
+          </p:cNvPicPr>
+          <p:nvPr/>
+        </p:nvPicPr>
+        <p:blipFill>
+          <a:blip r:embed="rId2"/>
+          <a:stretch>
+            <a:fillRect/>
+          </a:stretch>
+        </p:blipFill>
+        <p:spPr>
+          <a:xfrm>
+            <a:off x="464313" y="1747056"/>
+            <a:ext cx="7405363" cy="4712504"/>
+          </a:xfrm>
+          <a:prstGeom prst="rect">
+            <a:avLst/>
+          </a:prstGeom>
+        </p:spPr>
+      </p:pic>
+    </p:spTree>
+    <p:extLst>
+      <p:ext uri="{BB962C8B-B14F-4D97-AF65-F5344CB8AC3E}">
+        <p14:creationId xmlns:p14="http://schemas.microsoft.com/office/powerpoint/2010/main" val="1673050933"/>
+      </p:ext>
+    </p:extLst>
+  </p:cSld>
+  <p:clrMapOvr>
+    <a:masterClrMapping/>
+  </p:clrMapOvr>
+</p:sld>
+</file>
+
+<file path=ppt/slides/slide18.xml><?xml version="1.0" encoding="utf-8"?>
+<p:sld xmlns:a="http://schemas.openxmlformats.org/drawingml/2006/main" xmlns:r="http://schemas.openxmlformats.org/officeDocument/2006/relationships" xmlns:p="http://schemas.openxmlformats.org/presentationml/2006/main">
+  <p:cSld>
+    <p:spTree>
+      <p:nvGrpSpPr>
+        <p:cNvPr id="1" name=""/>
+        <p:cNvGrpSpPr/>
+        <p:nvPr/>
+      </p:nvGrpSpPr>
+      <p:grpSpPr>
+        <a:xfrm>
+          <a:off x="0" y="0"/>
+          <a:ext cx="0" cy="0"/>
+          <a:chOff x="0" y="0"/>
+          <a:chExt cx="0" cy="0"/>
+        </a:xfrm>
+      </p:grpSpPr>
+      <p:sp>
+        <p:nvSpPr>
+          <p:cNvPr id="2" name="Title 1">
+            <a:extLst>
+              <a:ext uri="{FF2B5EF4-FFF2-40B4-BE49-F238E27FC236}">
+                <a16:creationId xmlns:a16="http://schemas.microsoft.com/office/drawing/2014/main" id="{4EE71FBA-2EF8-4EF7-9DF7-667E682DBF93}"/>
+              </a:ext>
+            </a:extLst>
+          </p:cNvPr>
+          <p:cNvSpPr>
+            <a:spLocks noGrp="1"/>
+          </p:cNvSpPr>
+          <p:nvPr>
+            <p:ph type="title"/>
+          </p:nvPr>
+        </p:nvSpPr>
         <p:spPr/>
         <p:txBody>
           <a:bodyPr/>
@@ -7583,7 +7741,7 @@
           <a:p>
             <a:r>
               <a:rPr lang="en-US" dirty="0"/>
-              <a:t>Questions?</a:t>
+              <a:t>Question 7: Is there a relationship between IBU and ABV?</a:t>
             </a:r>
           </a:p>
         </p:txBody>
@@ -7593,7 +7751,7 @@
           <p:cNvPr id="3" name="Content Placeholder 2">
             <a:extLst>
               <a:ext uri="{FF2B5EF4-FFF2-40B4-BE49-F238E27FC236}">
-                <a16:creationId xmlns:a16="http://schemas.microsoft.com/office/drawing/2014/main" id="{390E119A-F40A-4B04-BA8F-7B613FCD4E57}"/>
+                <a16:creationId xmlns:a16="http://schemas.microsoft.com/office/drawing/2014/main" id="{D590D470-CB17-429C-856B-D71063E494D7}"/>
               </a:ext>
             </a:extLst>
           </p:cNvPr>
@@ -7609,14 +7767,411 @@
           <a:bodyPr/>
           <a:lstStyle/>
           <a:p>
-            <a:endParaRPr lang="en-US"/>
-          </a:p>
-        </p:txBody>
-      </p:sp>
+            <a:r>
+              <a:rPr lang="en-US" dirty="0"/>
+              <a:t>The Pearson correlation coefficient is 0.67, indicating a moderate correlation between IBU and ABV.</a:t>
+            </a:r>
+          </a:p>
+        </p:txBody>
+      </p:sp>
+      <p:pic>
+        <p:nvPicPr>
+          <p:cNvPr id="6" name="Picture 5">
+            <a:extLst>
+              <a:ext uri="{FF2B5EF4-FFF2-40B4-BE49-F238E27FC236}">
+                <a16:creationId xmlns:a16="http://schemas.microsoft.com/office/drawing/2014/main" id="{81907FA4-8E1E-4272-8A0E-61BF2A5C5E23}"/>
+              </a:ext>
+            </a:extLst>
+          </p:cNvPr>
+          <p:cNvPicPr>
+            <a:picLocks noChangeAspect="1"/>
+          </p:cNvPicPr>
+          <p:nvPr/>
+        </p:nvPicPr>
+        <p:blipFill>
+          <a:blip r:embed="rId2"/>
+          <a:stretch>
+            <a:fillRect/>
+          </a:stretch>
+        </p:blipFill>
+        <p:spPr>
+          <a:xfrm>
+            <a:off x="1167297" y="2857094"/>
+            <a:ext cx="7616741" cy="1143811"/>
+          </a:xfrm>
+          <a:prstGeom prst="rect">
+            <a:avLst/>
+          </a:prstGeom>
+        </p:spPr>
+      </p:pic>
     </p:spTree>
     <p:extLst>
       <p:ext uri="{BB962C8B-B14F-4D97-AF65-F5344CB8AC3E}">
-        <p14:creationId xmlns:p14="http://schemas.microsoft.com/office/powerpoint/2010/main" val="135111134"/>
+        <p14:creationId xmlns:p14="http://schemas.microsoft.com/office/powerpoint/2010/main" val="2042435455"/>
+      </p:ext>
+    </p:extLst>
+  </p:cSld>
+  <p:clrMapOvr>
+    <a:masterClrMapping/>
+  </p:clrMapOvr>
+</p:sld>
+</file>
+
+<file path=ppt/slides/slide19.xml><?xml version="1.0" encoding="utf-8"?>
+<p:sld xmlns:a="http://schemas.openxmlformats.org/drawingml/2006/main" xmlns:r="http://schemas.openxmlformats.org/officeDocument/2006/relationships" xmlns:p="http://schemas.openxmlformats.org/presentationml/2006/main">
+  <p:cSld>
+    <p:spTree>
+      <p:nvGrpSpPr>
+        <p:cNvPr id="1" name=""/>
+        <p:cNvGrpSpPr/>
+        <p:nvPr/>
+      </p:nvGrpSpPr>
+      <p:grpSpPr>
+        <a:xfrm>
+          <a:off x="0" y="0"/>
+          <a:ext cx="0" cy="0"/>
+          <a:chOff x="0" y="0"/>
+          <a:chExt cx="0" cy="0"/>
+        </a:xfrm>
+      </p:grpSpPr>
+      <p:sp>
+        <p:nvSpPr>
+          <p:cNvPr id="2" name="Title 1">
+            <a:extLst>
+              <a:ext uri="{FF2B5EF4-FFF2-40B4-BE49-F238E27FC236}">
+                <a16:creationId xmlns:a16="http://schemas.microsoft.com/office/drawing/2014/main" id="{4748F520-0073-48A0-87F4-113E2162345B}"/>
+              </a:ext>
+            </a:extLst>
+          </p:cNvPr>
+          <p:cNvSpPr>
+            <a:spLocks noGrp="1"/>
+          </p:cNvSpPr>
+          <p:nvPr>
+            <p:ph type="title"/>
+          </p:nvPr>
+        </p:nvSpPr>
+        <p:spPr/>
+        <p:txBody>
+          <a:bodyPr/>
+          <a:lstStyle/>
+          <a:p>
+            <a:r>
+              <a:rPr lang="en-US" dirty="0"/>
+              <a:t>Question 7: Is there a relationship between IBU and ABV?</a:t>
+            </a:r>
+          </a:p>
+        </p:txBody>
+      </p:sp>
+      <mc:AlternateContent xmlns:mc="http://schemas.openxmlformats.org/markup-compatibility/2006" xmlns:a14="http://schemas.microsoft.com/office/drawing/2010/main">
+        <mc:Choice Requires="a14">
+          <p:sp>
+            <p:nvSpPr>
+              <p:cNvPr id="3" name="Content Placeholder 2">
+                <a:extLst>
+                  <a:ext uri="{FF2B5EF4-FFF2-40B4-BE49-F238E27FC236}">
+                    <a16:creationId xmlns:a16="http://schemas.microsoft.com/office/drawing/2014/main" id="{531FD0A2-EB18-434A-84F1-A23D841CBF13}"/>
+                  </a:ext>
+                </a:extLst>
+              </p:cNvPr>
+              <p:cNvSpPr>
+                <a:spLocks noGrp="1"/>
+              </p:cNvSpPr>
+              <p:nvPr>
+                <p:ph idx="1"/>
+              </p:nvPr>
+            </p:nvSpPr>
+            <p:spPr/>
+            <p:txBody>
+              <a:bodyPr/>
+              <a:lstStyle/>
+              <a:p>
+                <a:r>
+                  <a:rPr lang="en-US" dirty="0"/>
+                  <a:t>We fit a simple linear regression model to the data. The model that describes the relationship between ABV and IBU is:</a:t>
+                </a:r>
+                <a:endParaRPr lang="en-US" i="1" dirty="0">
+                  <a:latin typeface="Cambria Math" panose="02040503050406030204" pitchFamily="18" charset="0"/>
+                </a:endParaRPr>
+              </a:p>
+              <a:p>
+                <a:pPr marL="0" indent="0">
+                  <a:buNone/>
+                </a:pPr>
+                <a14:m>
+                  <m:oMathPara xmlns:m="http://schemas.openxmlformats.org/officeDocument/2006/math">
+                    <m:oMathParaPr>
+                      <m:jc m:val="centerGroup"/>
+                    </m:oMathParaPr>
+                    <m:oMath xmlns:m="http://schemas.openxmlformats.org/officeDocument/2006/math">
+                      <m:r>
+                        <a:rPr lang="en-US" i="1">
+                          <a:latin typeface="Cambria Math" panose="02040503050406030204" pitchFamily="18" charset="0"/>
+                        </a:rPr>
+                        <m:t>𝐼𝐵𝑈</m:t>
+                      </m:r>
+                      <m:r>
+                        <a:rPr lang="en-US" i="1">
+                          <a:latin typeface="Cambria Math" panose="02040503050406030204" pitchFamily="18" charset="0"/>
+                        </a:rPr>
+                        <m:t>=−34.099+1282.037∗</m:t>
+                      </m:r>
+                      <m:r>
+                        <a:rPr lang="en-US" i="1">
+                          <a:latin typeface="Cambria Math" panose="02040503050406030204" pitchFamily="18" charset="0"/>
+                        </a:rPr>
+                        <m:t>𝐴𝐵𝑉</m:t>
+                      </m:r>
+                    </m:oMath>
+                  </m:oMathPara>
+                </a14:m>
+                <a:endParaRPr lang="en-US" dirty="0"/>
+              </a:p>
+              <a:p>
+                <a:pPr marL="0" indent="0">
+                  <a:buNone/>
+                </a:pPr>
+                <a:endParaRPr lang="en-US" dirty="0"/>
+              </a:p>
+            </p:txBody>
+          </p:sp>
+        </mc:Choice>
+        <mc:Fallback xmlns="">
+          <p:sp>
+            <p:nvSpPr>
+              <p:cNvPr id="3" name="Content Placeholder 2">
+                <a:extLst>
+                  <a:ext uri="{FF2B5EF4-FFF2-40B4-BE49-F238E27FC236}">
+                    <a16:creationId xmlns:a16="http://schemas.microsoft.com/office/drawing/2014/main" id="{531FD0A2-EB18-434A-84F1-A23D841CBF13}"/>
+                  </a:ext>
+                </a:extLst>
+              </p:cNvPr>
+              <p:cNvSpPr>
+                <a:spLocks noGrp="1" noRot="1" noChangeAspect="1" noMove="1" noResize="1" noEditPoints="1" noAdjustHandles="1" noChangeArrowheads="1" noChangeShapeType="1" noTextEdit="1"/>
+              </p:cNvSpPr>
+              <p:nvPr>
+                <p:ph idx="1"/>
+              </p:nvPr>
+            </p:nvSpPr>
+            <p:spPr>
+              <a:blipFill>
+                <a:blip r:embed="rId2"/>
+                <a:stretch>
+                  <a:fillRect l="-142" t="-942" r="-355"/>
+                </a:stretch>
+              </a:blipFill>
+            </p:spPr>
+            <p:txBody>
+              <a:bodyPr/>
+              <a:lstStyle/>
+              <a:p>
+                <a:r>
+                  <a:rPr lang="en-US">
+                    <a:noFill/>
+                  </a:rPr>
+                  <a:t> </a:t>
+                </a:r>
+              </a:p>
+            </p:txBody>
+          </p:sp>
+        </mc:Fallback>
+      </mc:AlternateContent>
+      <mc:AlternateContent xmlns:mc="http://schemas.openxmlformats.org/markup-compatibility/2006" xmlns:a14="http://schemas.microsoft.com/office/drawing/2010/main">
+        <mc:Choice Requires="a14">
+          <p:sp>
+            <p:nvSpPr>
+              <p:cNvPr id="6" name="TextBox 5">
+                <a:extLst>
+                  <a:ext uri="{FF2B5EF4-FFF2-40B4-BE49-F238E27FC236}">
+                    <a16:creationId xmlns:a16="http://schemas.microsoft.com/office/drawing/2014/main" id="{25B888B2-678B-4ED2-B9BF-9EDEA9D29C85}"/>
+                  </a:ext>
+                </a:extLst>
+              </p:cNvPr>
+              <p:cNvSpPr txBox="1"/>
+              <p:nvPr/>
+            </p:nvSpPr>
+            <p:spPr>
+              <a:xfrm>
+                <a:off x="6151268" y="3429000"/>
+                <a:ext cx="2409827" cy="553998"/>
+              </a:xfrm>
+              <a:prstGeom prst="rect">
+                <a:avLst/>
+              </a:prstGeom>
+              <a:noFill/>
+            </p:spPr>
+            <p:txBody>
+              <a:bodyPr wrap="none" lIns="0" tIns="0" rIns="0" bIns="0" rtlCol="0">
+                <a:spAutoFit/>
+              </a:bodyPr>
+              <a:lstStyle/>
+              <a:p>
+                <a14:m>
+                  <m:oMath xmlns:m="http://schemas.openxmlformats.org/officeDocument/2006/math">
+                    <m:sSup>
+                      <m:sSupPr>
+                        <m:ctrlPr>
+                          <a:rPr lang="en-US" i="1" smtClean="0">
+                            <a:latin typeface="Cambria Math" panose="02040503050406030204" pitchFamily="18" charset="0"/>
+                          </a:rPr>
+                        </m:ctrlPr>
+                      </m:sSupPr>
+                      <m:e>
+                        <m:r>
+                          <a:rPr lang="en-US" b="0" i="1" smtClean="0">
+                            <a:latin typeface="Cambria Math" panose="02040503050406030204" pitchFamily="18" charset="0"/>
+                          </a:rPr>
+                          <m:t>𝑅</m:t>
+                        </m:r>
+                      </m:e>
+                      <m:sup>
+                        <m:r>
+                          <a:rPr lang="en-US" b="0" i="1" smtClean="0">
+                            <a:latin typeface="Cambria Math" panose="02040503050406030204" pitchFamily="18" charset="0"/>
+                          </a:rPr>
+                          <m:t>2</m:t>
+                        </m:r>
+                      </m:sup>
+                    </m:sSup>
+                    <m:r>
+                      <a:rPr lang="en-US" b="0" i="1" smtClean="0">
+                        <a:latin typeface="Cambria Math" panose="02040503050406030204" pitchFamily="18" charset="0"/>
+                      </a:rPr>
+                      <m:t>=.45</m:t>
+                    </m:r>
+                  </m:oMath>
+                </a14:m>
+                <a:r>
+                  <a:rPr lang="en-US" b="0" dirty="0"/>
+                  <a:t> </a:t>
+                </a:r>
+              </a:p>
+              <a:p>
+                <a14:m>
+                  <m:oMath xmlns:m="http://schemas.openxmlformats.org/officeDocument/2006/math">
+                    <m:r>
+                      <a:rPr lang="en-US" b="0" i="1" smtClean="0">
+                        <a:latin typeface="Cambria Math" panose="02040503050406030204" pitchFamily="18" charset="0"/>
+                      </a:rPr>
+                      <m:t>𝑃</m:t>
+                    </m:r>
+                    <m:d>
+                      <m:dPr>
+                        <m:ctrlPr>
+                          <a:rPr lang="en-US" b="0" i="1" smtClean="0">
+                            <a:latin typeface="Cambria Math" panose="02040503050406030204" pitchFamily="18" charset="0"/>
+                          </a:rPr>
+                        </m:ctrlPr>
+                      </m:dPr>
+                      <m:e>
+                        <m:r>
+                          <a:rPr lang="en-US" b="0" i="1" smtClean="0">
+                            <a:latin typeface="Cambria Math" panose="02040503050406030204" pitchFamily="18" charset="0"/>
+                          </a:rPr>
+                          <m:t>𝐹</m:t>
+                        </m:r>
+                        <m:r>
+                          <a:rPr lang="en-US" b="0" i="1" smtClean="0">
+                            <a:latin typeface="Cambria Math" panose="02040503050406030204" pitchFamily="18" charset="0"/>
+                          </a:rPr>
+                          <m:t>&gt;1147</m:t>
+                        </m:r>
+                      </m:e>
+                    </m:d>
+                    <m:r>
+                      <a:rPr lang="en-US" b="0" i="1" smtClean="0">
+                        <a:latin typeface="Cambria Math" panose="02040503050406030204" pitchFamily="18" charset="0"/>
+                      </a:rPr>
+                      <m:t>&lt;0.0001</m:t>
+                    </m:r>
+                  </m:oMath>
+                </a14:m>
+                <a:r>
+                  <a:rPr lang="en-US" dirty="0"/>
+                  <a:t> </a:t>
+                </a:r>
+              </a:p>
+            </p:txBody>
+          </p:sp>
+        </mc:Choice>
+        <mc:Fallback xmlns="">
+          <p:sp>
+            <p:nvSpPr>
+              <p:cNvPr id="6" name="TextBox 5">
+                <a:extLst>
+                  <a:ext uri="{FF2B5EF4-FFF2-40B4-BE49-F238E27FC236}">
+                    <a16:creationId xmlns:a16="http://schemas.microsoft.com/office/drawing/2014/main" id="{25B888B2-678B-4ED2-B9BF-9EDEA9D29C85}"/>
+                  </a:ext>
+                </a:extLst>
+              </p:cNvPr>
+              <p:cNvSpPr txBox="1">
+                <a:spLocks noRot="1" noChangeAspect="1" noMove="1" noResize="1" noEditPoints="1" noAdjustHandles="1" noChangeArrowheads="1" noChangeShapeType="1" noTextEdit="1"/>
+              </p:cNvSpPr>
+              <p:nvPr/>
+            </p:nvSpPr>
+            <p:spPr>
+              <a:xfrm>
+                <a:off x="6151268" y="3429000"/>
+                <a:ext cx="2409827" cy="553998"/>
+              </a:xfrm>
+              <a:prstGeom prst="rect">
+                <a:avLst/>
+              </a:prstGeom>
+              <a:blipFill>
+                <a:blip r:embed="rId3"/>
+                <a:stretch>
+                  <a:fillRect l="-3291" t="-1111" b="-4444"/>
+                </a:stretch>
+              </a:blipFill>
+            </p:spPr>
+            <p:txBody>
+              <a:bodyPr/>
+              <a:lstStyle/>
+              <a:p>
+                <a:r>
+                  <a:rPr lang="en-US">
+                    <a:noFill/>
+                  </a:rPr>
+                  <a:t> </a:t>
+                </a:r>
+              </a:p>
+            </p:txBody>
+          </p:sp>
+        </mc:Fallback>
+      </mc:AlternateContent>
+      <p:pic>
+        <p:nvPicPr>
+          <p:cNvPr id="7" name="Picture 6">
+            <a:extLst>
+              <a:ext uri="{FF2B5EF4-FFF2-40B4-BE49-F238E27FC236}">
+                <a16:creationId xmlns:a16="http://schemas.microsoft.com/office/drawing/2014/main" id="{58173B27-6763-46A0-B75A-C92849213A55}"/>
+              </a:ext>
+            </a:extLst>
+          </p:cNvPr>
+          <p:cNvPicPr>
+            <a:picLocks noChangeAspect="1"/>
+          </p:cNvPicPr>
+          <p:nvPr/>
+        </p:nvPicPr>
+        <p:blipFill>
+          <a:blip r:embed="rId4"/>
+          <a:stretch>
+            <a:fillRect/>
+          </a:stretch>
+        </p:blipFill>
+        <p:spPr>
+          <a:xfrm>
+            <a:off x="1012487" y="3062186"/>
+            <a:ext cx="4736560" cy="3561063"/>
+          </a:xfrm>
+          <a:prstGeom prst="rect">
+            <a:avLst/>
+          </a:prstGeom>
+        </p:spPr>
+      </p:pic>
+    </p:spTree>
+    <p:extLst>
+      <p:ext uri="{BB962C8B-B14F-4D97-AF65-F5344CB8AC3E}">
+        <p14:creationId xmlns:p14="http://schemas.microsoft.com/office/powerpoint/2010/main" val="1279050090"/>
       </p:ext>
     </p:extLst>
   </p:cSld>
@@ -7737,6 +8292,89 @@
 </p:sld>
 </file>
 
+<file path=ppt/slides/slide20.xml><?xml version="1.0" encoding="utf-8"?>
+<p:sld xmlns:a="http://schemas.openxmlformats.org/drawingml/2006/main" xmlns:r="http://schemas.openxmlformats.org/officeDocument/2006/relationships" xmlns:p="http://schemas.openxmlformats.org/presentationml/2006/main">
+  <p:cSld>
+    <p:spTree>
+      <p:nvGrpSpPr>
+        <p:cNvPr id="1" name=""/>
+        <p:cNvGrpSpPr/>
+        <p:nvPr/>
+      </p:nvGrpSpPr>
+      <p:grpSpPr>
+        <a:xfrm>
+          <a:off x="0" y="0"/>
+          <a:ext cx="0" cy="0"/>
+          <a:chOff x="0" y="0"/>
+          <a:chExt cx="0" cy="0"/>
+        </a:xfrm>
+      </p:grpSpPr>
+      <p:sp>
+        <p:nvSpPr>
+          <p:cNvPr id="2" name="Title 1">
+            <a:extLst>
+              <a:ext uri="{FF2B5EF4-FFF2-40B4-BE49-F238E27FC236}">
+                <a16:creationId xmlns:a16="http://schemas.microsoft.com/office/drawing/2014/main" id="{38642D8D-4F65-4538-83C8-B07809A4E6DB}"/>
+              </a:ext>
+            </a:extLst>
+          </p:cNvPr>
+          <p:cNvSpPr>
+            <a:spLocks noGrp="1"/>
+          </p:cNvSpPr>
+          <p:nvPr>
+            <p:ph type="title"/>
+          </p:nvPr>
+        </p:nvSpPr>
+        <p:spPr/>
+        <p:txBody>
+          <a:bodyPr/>
+          <a:lstStyle/>
+          <a:p>
+            <a:r>
+              <a:rPr lang="en-US" dirty="0"/>
+              <a:t>Questions?</a:t>
+            </a:r>
+          </a:p>
+        </p:txBody>
+      </p:sp>
+      <p:sp>
+        <p:nvSpPr>
+          <p:cNvPr id="3" name="Content Placeholder 2">
+            <a:extLst>
+              <a:ext uri="{FF2B5EF4-FFF2-40B4-BE49-F238E27FC236}">
+                <a16:creationId xmlns:a16="http://schemas.microsoft.com/office/drawing/2014/main" id="{390E119A-F40A-4B04-BA8F-7B613FCD4E57}"/>
+              </a:ext>
+            </a:extLst>
+          </p:cNvPr>
+          <p:cNvSpPr>
+            <a:spLocks noGrp="1"/>
+          </p:cNvSpPr>
+          <p:nvPr>
+            <p:ph idx="1"/>
+          </p:nvPr>
+        </p:nvSpPr>
+        <p:spPr/>
+        <p:txBody>
+          <a:bodyPr/>
+          <a:lstStyle/>
+          <a:p>
+            <a:endParaRPr lang="en-US"/>
+          </a:p>
+        </p:txBody>
+      </p:sp>
+    </p:spTree>
+    <p:extLst>
+      <p:ext uri="{BB962C8B-B14F-4D97-AF65-F5344CB8AC3E}">
+        <p14:creationId xmlns:p14="http://schemas.microsoft.com/office/powerpoint/2010/main" val="135111134"/>
+      </p:ext>
+    </p:extLst>
+  </p:cSld>
+  <p:clrMapOvr>
+    <a:masterClrMapping/>
+  </p:clrMapOvr>
+</p:sld>
+</file>
+
 <file path=ppt/slides/slide3.xml><?xml version="1.0" encoding="utf-8"?>
 <p:sld xmlns:a="http://schemas.openxmlformats.org/drawingml/2006/main" xmlns:r="http://schemas.openxmlformats.org/officeDocument/2006/relationships" xmlns:p="http://schemas.openxmlformats.org/presentationml/2006/main">
   <p:cSld>
@@ -7801,7 +8439,7 @@
         <p:spPr/>
         <p:txBody>
           <a:bodyPr>
-            <a:normAutofit fontScale="92500" lnSpcReduction="20000"/>
+            <a:normAutofit/>
           </a:bodyPr>
           <a:lstStyle/>
           <a:p>
@@ -7873,33 +8511,6 @@
               <a:rPr lang="en-US" dirty="0"/>
               <a:t>Ggplot2</a:t>
             </a:r>
-          </a:p>
-          <a:p>
-            <a:pPr lvl="1"/>
-            <a:r>
-              <a:rPr lang="en-US" dirty="0" err="1"/>
-              <a:t>Data.table</a:t>
-            </a:r>
-            <a:endParaRPr lang="en-US" dirty="0"/>
-          </a:p>
-          <a:p>
-            <a:pPr lvl="1"/>
-            <a:r>
-              <a:rPr lang="en-US" dirty="0"/>
-              <a:t>Reshape2</a:t>
-            </a:r>
-          </a:p>
-          <a:p>
-            <a:pPr lvl="1"/>
-            <a:r>
-              <a:rPr lang="en-US" dirty="0" err="1"/>
-              <a:t>doBy</a:t>
-            </a:r>
-            <a:endParaRPr lang="en-US" dirty="0"/>
-          </a:p>
-          <a:p>
-            <a:pPr lvl="1"/>
-            <a:endParaRPr lang="en-US" dirty="0"/>
           </a:p>
         </p:txBody>
       </p:sp>
@@ -8310,10 +8921,10 @@
       </p:sp>
       <p:pic>
         <p:nvPicPr>
-          <p:cNvPr id="4" name="Picture 3">
+          <p:cNvPr id="5" name="Picture 4">
             <a:extLst>
               <a:ext uri="{FF2B5EF4-FFF2-40B4-BE49-F238E27FC236}">
-                <a16:creationId xmlns:a16="http://schemas.microsoft.com/office/drawing/2014/main" id="{7C404324-3ACD-4701-A820-69D329739161}"/>
+                <a16:creationId xmlns:a16="http://schemas.microsoft.com/office/drawing/2014/main" id="{AA214E6B-D2DC-4070-9C07-69C6E2A62637}"/>
               </a:ext>
             </a:extLst>
           </p:cNvPr>
@@ -8330,8 +8941,8 @@
         </p:blipFill>
         <p:spPr>
           <a:xfrm>
-            <a:off x="677334" y="1703295"/>
-            <a:ext cx="7596119" cy="2303928"/>
+            <a:off x="677333" y="1737603"/>
+            <a:ext cx="7363771" cy="2172916"/>
           </a:xfrm>
           <a:prstGeom prst="rect">
             <a:avLst/>

</xml_diff>

<commit_message>
updated scatter plot to fit color scheme
</commit_message>
<xml_diff>
--- a/Breweries and Beer Study.pptx
+++ b/Breweries and Beer Study.pptx
@@ -7660,10 +7660,10 @@
       </p:sp>
       <p:pic>
         <p:nvPicPr>
-          <p:cNvPr id="3" name="Picture 2">
+          <p:cNvPr id="4" name="Picture 3">
             <a:extLst>
               <a:ext uri="{FF2B5EF4-FFF2-40B4-BE49-F238E27FC236}">
-                <a16:creationId xmlns:a16="http://schemas.microsoft.com/office/drawing/2014/main" id="{0272154B-D300-41D1-9099-259C8075ED66}"/>
+                <a16:creationId xmlns:a16="http://schemas.microsoft.com/office/drawing/2014/main" id="{58EE141A-7386-455B-BF9D-C53CBA8FD8D6}"/>
               </a:ext>
             </a:extLst>
           </p:cNvPr>
@@ -7680,8 +7680,8 @@
         </p:blipFill>
         <p:spPr>
           <a:xfrm>
-            <a:off x="464313" y="1747056"/>
-            <a:ext cx="7405363" cy="4712504"/>
+            <a:off x="557473" y="1930400"/>
+            <a:ext cx="7214925" cy="4591316"/>
           </a:xfrm>
           <a:prstGeom prst="rect">
             <a:avLst/>

</xml_diff>